<commit_message>
Enregistrement en csv du scrapping de la base de données
</commit_message>
<xml_diff>
--- a/documentation/architecture logicielle.pptx
+++ b/documentation/architecture logicielle.pptx
@@ -3073,7 +3073,7 @@
           <a:p>
             <a:fld id="{090BB305-B547-43E9-A3C0-FBFA669CED81}" type="datetimeFigureOut">
               <a:rPr lang="fr-FR" smtClean="0"/>
-              <a:t>30/03/2021</a:t>
+              <a:t>06/12/2021</a:t>
             </a:fld>
             <a:endParaRPr lang="fr-FR"/>
           </a:p>
@@ -3243,7 +3243,7 @@
           <a:p>
             <a:fld id="{090BB305-B547-43E9-A3C0-FBFA669CED81}" type="datetimeFigureOut">
               <a:rPr lang="fr-FR" smtClean="0"/>
-              <a:t>30/03/2021</a:t>
+              <a:t>06/12/2021</a:t>
             </a:fld>
             <a:endParaRPr lang="fr-FR"/>
           </a:p>
@@ -3423,7 +3423,7 @@
           <a:p>
             <a:fld id="{090BB305-B547-43E9-A3C0-FBFA669CED81}" type="datetimeFigureOut">
               <a:rPr lang="fr-FR" smtClean="0"/>
-              <a:t>30/03/2021</a:t>
+              <a:t>06/12/2021</a:t>
             </a:fld>
             <a:endParaRPr lang="fr-FR"/>
           </a:p>
@@ -3593,7 +3593,7 @@
           <a:p>
             <a:fld id="{090BB305-B547-43E9-A3C0-FBFA669CED81}" type="datetimeFigureOut">
               <a:rPr lang="fr-FR" smtClean="0"/>
-              <a:t>30/03/2021</a:t>
+              <a:t>06/12/2021</a:t>
             </a:fld>
             <a:endParaRPr lang="fr-FR"/>
           </a:p>
@@ -3839,7 +3839,7 @@
           <a:p>
             <a:fld id="{090BB305-B547-43E9-A3C0-FBFA669CED81}" type="datetimeFigureOut">
               <a:rPr lang="fr-FR" smtClean="0"/>
-              <a:t>30/03/2021</a:t>
+              <a:t>06/12/2021</a:t>
             </a:fld>
             <a:endParaRPr lang="fr-FR"/>
           </a:p>
@@ -4071,7 +4071,7 @@
           <a:p>
             <a:fld id="{090BB305-B547-43E9-A3C0-FBFA669CED81}" type="datetimeFigureOut">
               <a:rPr lang="fr-FR" smtClean="0"/>
-              <a:t>30/03/2021</a:t>
+              <a:t>06/12/2021</a:t>
             </a:fld>
             <a:endParaRPr lang="fr-FR"/>
           </a:p>
@@ -4438,7 +4438,7 @@
           <a:p>
             <a:fld id="{090BB305-B547-43E9-A3C0-FBFA669CED81}" type="datetimeFigureOut">
               <a:rPr lang="fr-FR" smtClean="0"/>
-              <a:t>30/03/2021</a:t>
+              <a:t>06/12/2021</a:t>
             </a:fld>
             <a:endParaRPr lang="fr-FR"/>
           </a:p>
@@ -4556,7 +4556,7 @@
           <a:p>
             <a:fld id="{090BB305-B547-43E9-A3C0-FBFA669CED81}" type="datetimeFigureOut">
               <a:rPr lang="fr-FR" smtClean="0"/>
-              <a:t>30/03/2021</a:t>
+              <a:t>06/12/2021</a:t>
             </a:fld>
             <a:endParaRPr lang="fr-FR"/>
           </a:p>
@@ -4651,7 +4651,7 @@
           <a:p>
             <a:fld id="{090BB305-B547-43E9-A3C0-FBFA669CED81}" type="datetimeFigureOut">
               <a:rPr lang="fr-FR" smtClean="0"/>
-              <a:t>30/03/2021</a:t>
+              <a:t>06/12/2021</a:t>
             </a:fld>
             <a:endParaRPr lang="fr-FR"/>
           </a:p>
@@ -4928,7 +4928,7 @@
           <a:p>
             <a:fld id="{090BB305-B547-43E9-A3C0-FBFA669CED81}" type="datetimeFigureOut">
               <a:rPr lang="fr-FR" smtClean="0"/>
-              <a:t>30/03/2021</a:t>
+              <a:t>06/12/2021</a:t>
             </a:fld>
             <a:endParaRPr lang="fr-FR"/>
           </a:p>
@@ -5181,7 +5181,7 @@
           <a:p>
             <a:fld id="{090BB305-B547-43E9-A3C0-FBFA669CED81}" type="datetimeFigureOut">
               <a:rPr lang="fr-FR" smtClean="0"/>
-              <a:t>30/03/2021</a:t>
+              <a:t>06/12/2021</a:t>
             </a:fld>
             <a:endParaRPr lang="fr-FR"/>
           </a:p>
@@ -5394,7 +5394,7 @@
           <a:p>
             <a:fld id="{090BB305-B547-43E9-A3C0-FBFA669CED81}" type="datetimeFigureOut">
               <a:rPr lang="fr-FR" smtClean="0"/>
-              <a:t>30/03/2021</a:t>
+              <a:t>06/12/2021</a:t>
             </a:fld>
             <a:endParaRPr lang="fr-FR"/>
           </a:p>
@@ -5887,7 +5887,7 @@
         </p:nvSpPr>
         <p:spPr>
           <a:xfrm>
-            <a:off x="838199" y="-15334"/>
+            <a:off x="816551" y="35225"/>
             <a:ext cx="10515600" cy="845113"/>
           </a:xfrm>
         </p:spPr>
@@ -5912,8 +5912,8 @@
         </p:nvSpPr>
         <p:spPr>
           <a:xfrm>
-            <a:off x="238989" y="1393711"/>
-            <a:ext cx="2036618" cy="1778434"/>
+            <a:off x="-6063" y="1353692"/>
+            <a:ext cx="2036618" cy="2154159"/>
           </a:xfrm>
           <a:prstGeom prst="roundRect">
             <a:avLst/>
@@ -5952,11 +5952,19 @@
             <a:pPr algn="ctr"/>
             <a:r>
               <a:rPr lang="fr-FR" dirty="0" smtClean="0"/>
-              <a:t>Récupère les données de la FFCK et les stocke à l’aide de </a:t>
+              <a:t>Récupère les données de la FFCK et les stocke </a:t>
+            </a:r>
+            <a:r>
+              <a:rPr lang="fr-FR" dirty="0"/>
+              <a:t>s</a:t>
+            </a:r>
+            <a:r>
+              <a:rPr lang="fr-FR" dirty="0" smtClean="0"/>
+              <a:t>ous format CSV avec </a:t>
             </a:r>
             <a:r>
               <a:rPr lang="fr-FR" dirty="0" err="1" smtClean="0"/>
-              <a:t>DatabaseService</a:t>
+              <a:t>CsvDataService</a:t>
             </a:r>
             <a:endParaRPr lang="fr-FR" dirty="0"/>
           </a:p>
@@ -5970,7 +5978,7 @@
         </p:nvSpPr>
         <p:spPr>
           <a:xfrm>
-            <a:off x="3318162" y="1591685"/>
+            <a:off x="5560000" y="1347660"/>
             <a:ext cx="2777837" cy="1007198"/>
           </a:xfrm>
           <a:prstGeom prst="roundRect">
@@ -6086,7 +6094,7 @@
         </p:nvSpPr>
         <p:spPr>
           <a:xfrm>
-            <a:off x="-591419" y="4555068"/>
+            <a:off x="109971" y="4942556"/>
             <a:ext cx="2957946" cy="1925348"/>
           </a:xfrm>
           <a:prstGeom prst="roundRect">
@@ -6144,7 +6152,7 @@
         </p:nvSpPr>
         <p:spPr>
           <a:xfrm>
-            <a:off x="2822862" y="5169280"/>
+            <a:off x="3199101" y="5330483"/>
             <a:ext cx="2036618" cy="1537421"/>
           </a:xfrm>
           <a:prstGeom prst="roundRect">
@@ -6201,7 +6209,7 @@
         </p:nvSpPr>
         <p:spPr>
           <a:xfrm>
-            <a:off x="4826575" y="3346857"/>
+            <a:off x="5498087" y="4369039"/>
             <a:ext cx="2495551" cy="1730155"/>
           </a:xfrm>
           <a:prstGeom prst="roundRect">
@@ -6322,7 +6330,7 @@
         <p:spPr>
           <a:xfrm flipH="1" flipV="1">
             <a:off x="2275608" y="1287214"/>
-            <a:ext cx="2431473" cy="304471"/>
+            <a:ext cx="4673311" cy="60446"/>
           </a:xfrm>
           <a:prstGeom prst="straightConnector1">
             <a:avLst/>
@@ -6351,14 +6359,14 @@
           <p:cNvPr id="29" name="Connecteur droit avec flèche 28"/>
           <p:cNvCxnSpPr>
             <a:stCxn id="4" idx="3"/>
-            <a:endCxn id="5" idx="1"/>
+            <a:endCxn id="30" idx="1"/>
           </p:cNvCxnSpPr>
           <p:nvPr/>
         </p:nvCxnSpPr>
         <p:spPr>
           <a:xfrm flipV="1">
-            <a:off x="2275607" y="2095284"/>
-            <a:ext cx="1042555" cy="187644"/>
+            <a:off x="2030555" y="2415304"/>
+            <a:ext cx="321986" cy="15468"/>
           </a:xfrm>
           <a:prstGeom prst="straightConnector1">
             <a:avLst/>
@@ -6393,8 +6401,8 @@
         </p:nvCxnSpPr>
         <p:spPr>
           <a:xfrm flipH="1" flipV="1">
-            <a:off x="2366527" y="5517742"/>
-            <a:ext cx="456335" cy="420249"/>
+            <a:off x="3067917" y="5905230"/>
+            <a:ext cx="131184" cy="193964"/>
           </a:xfrm>
           <a:prstGeom prst="straightConnector1">
             <a:avLst/>
@@ -6490,9 +6498,9 @@
           <p:nvPr/>
         </p:nvCxnSpPr>
         <p:spPr>
-          <a:xfrm flipH="1" flipV="1">
-            <a:off x="4707081" y="2598883"/>
-            <a:ext cx="1367270" cy="747974"/>
+          <a:xfrm flipV="1">
+            <a:off x="6745863" y="2354858"/>
+            <a:ext cx="203056" cy="2014181"/>
           </a:xfrm>
           <a:prstGeom prst="straightConnector1">
             <a:avLst/>
@@ -6527,8 +6535,8 @@
         </p:nvCxnSpPr>
         <p:spPr>
           <a:xfrm flipH="1" flipV="1">
-            <a:off x="4707081" y="2598883"/>
-            <a:ext cx="5579918" cy="792220"/>
+            <a:off x="6948919" y="2354858"/>
+            <a:ext cx="3338080" cy="1036245"/>
           </a:xfrm>
           <a:prstGeom prst="straightConnector1">
             <a:avLst/>
@@ -6599,8 +6607,8 @@
         </p:nvCxnSpPr>
         <p:spPr>
           <a:xfrm flipV="1">
-            <a:off x="887554" y="2598883"/>
-            <a:ext cx="3819527" cy="1956185"/>
+            <a:off x="1588944" y="2354858"/>
+            <a:ext cx="5359975" cy="2587698"/>
           </a:xfrm>
           <a:prstGeom prst="straightConnector1">
             <a:avLst/>
@@ -6635,8 +6643,8 @@
         </p:nvCxnSpPr>
         <p:spPr>
           <a:xfrm flipV="1">
-            <a:off x="3841171" y="2598883"/>
-            <a:ext cx="865910" cy="2570397"/>
+            <a:off x="4217410" y="2354858"/>
+            <a:ext cx="2731509" cy="2975625"/>
           </a:xfrm>
           <a:prstGeom prst="straightConnector1">
             <a:avLst/>
@@ -6670,9 +6678,9 @@
           <p:nvPr/>
         </p:nvCxnSpPr>
         <p:spPr>
-          <a:xfrm flipV="1">
-            <a:off x="4859480" y="5077012"/>
-            <a:ext cx="1214871" cy="860979"/>
+          <a:xfrm>
+            <a:off x="5235719" y="6099194"/>
+            <a:ext cx="1510144" cy="0"/>
           </a:xfrm>
           <a:prstGeom prst="straightConnector1">
             <a:avLst/>
@@ -6707,8 +6715,8 @@
         </p:nvCxnSpPr>
         <p:spPr>
           <a:xfrm flipH="1">
-            <a:off x="7322126" y="1741236"/>
-            <a:ext cx="1716232" cy="2470699"/>
+            <a:off x="7993638" y="1741236"/>
+            <a:ext cx="1044720" cy="3492881"/>
           </a:xfrm>
           <a:prstGeom prst="straightConnector1">
             <a:avLst/>
@@ -6743,8 +6751,106 @@
         </p:nvCxnSpPr>
         <p:spPr>
           <a:xfrm flipH="1">
-            <a:off x="6095999" y="1741236"/>
-            <a:ext cx="2942359" cy="354048"/>
+            <a:off x="8337837" y="1741236"/>
+            <a:ext cx="700521" cy="110023"/>
+          </a:xfrm>
+          <a:prstGeom prst="straightConnector1">
+            <a:avLst/>
+          </a:prstGeom>
+          <a:ln>
+            <a:tailEnd type="triangle"/>
+          </a:ln>
+        </p:spPr>
+        <p:style>
+          <a:lnRef idx="1">
+            <a:schemeClr val="accent1"/>
+          </a:lnRef>
+          <a:fillRef idx="0">
+            <a:schemeClr val="accent1"/>
+          </a:fillRef>
+          <a:effectRef idx="0">
+            <a:schemeClr val="accent1"/>
+          </a:effectRef>
+          <a:fontRef idx="minor">
+            <a:schemeClr val="tx1"/>
+          </a:fontRef>
+        </p:style>
+      </p:cxnSp>
+      <p:sp>
+        <p:nvSpPr>
+          <p:cNvPr id="30" name="Rectangle à coins arrondis 29"/>
+          <p:cNvSpPr/>
+          <p:nvPr/>
+        </p:nvSpPr>
+        <p:spPr>
+          <a:xfrm>
+            <a:off x="2352541" y="1610910"/>
+            <a:ext cx="2506938" cy="1608788"/>
+          </a:xfrm>
+          <a:prstGeom prst="roundRect">
+            <a:avLst/>
+          </a:prstGeom>
+          <a:ln>
+            <a:solidFill>
+              <a:schemeClr val="accent5"/>
+            </a:solidFill>
+          </a:ln>
+        </p:spPr>
+        <p:style>
+          <a:lnRef idx="2">
+            <a:schemeClr val="accent6"/>
+          </a:lnRef>
+          <a:fillRef idx="1">
+            <a:schemeClr val="lt1"/>
+          </a:fillRef>
+          <a:effectRef idx="0">
+            <a:schemeClr val="accent6"/>
+          </a:effectRef>
+          <a:fontRef idx="minor">
+            <a:schemeClr val="dk1"/>
+          </a:fontRef>
+        </p:style>
+        <p:txBody>
+          <a:bodyPr rtlCol="0" anchor="ctr"/>
+          <a:lstStyle/>
+          <a:p>
+            <a:pPr algn="ctr"/>
+            <a:r>
+              <a:rPr lang="fr-FR" sz="2400" b="1" u="sng" dirty="0" err="1" smtClean="0"/>
+              <a:t>CsvDataService</a:t>
+            </a:r>
+            <a:r>
+              <a:rPr lang="fr-FR" sz="2400" b="1" u="sng" dirty="0" smtClean="0"/>
+              <a:t> </a:t>
+            </a:r>
+            <a:r>
+              <a:rPr lang="fr-FR" sz="2400" b="1" u="sng" dirty="0" smtClean="0"/>
+              <a:t>:</a:t>
+            </a:r>
+          </a:p>
+          <a:p>
+            <a:pPr algn="ctr"/>
+            <a:r>
+              <a:rPr lang="fr-FR" dirty="0" smtClean="0"/>
+              <a:t>Permet d’enregistrer et de lire les fichiers de courses sous format csv</a:t>
+            </a:r>
+            <a:endParaRPr lang="fr-FR" dirty="0"/>
+          </a:p>
+        </p:txBody>
+      </p:sp>
+      <p:cxnSp>
+        <p:nvCxnSpPr>
+          <p:cNvPr id="49" name="Connecteur droit avec flèche 48"/>
+          <p:cNvCxnSpPr>
+            <a:stCxn id="30" idx="3"/>
+            <a:endCxn id="5" idx="1"/>
+          </p:cNvCxnSpPr>
+          <p:nvPr/>
+        </p:nvCxnSpPr>
+        <p:spPr>
+          <a:xfrm flipV="1">
+            <a:off x="4859479" y="1851259"/>
+            <a:ext cx="700521" cy="564045"/>
           </a:xfrm>
           <a:prstGeom prst="straightConnector1">
             <a:avLst/>
@@ -7020,7 +7126,6 @@
               <a:rPr lang="fr-FR" i="1" dirty="0" smtClean="0"/>
               <a:t>)</a:t>
             </a:r>
-            <a:endParaRPr lang="fr-FR" i="1" dirty="0" smtClean="0"/>
           </a:p>
           <a:p>
             <a:pPr algn="ctr"/>
@@ -7205,15 +7310,7 @@
                   <a:schemeClr val="accent6"/>
                 </a:solidFill>
               </a:rPr>
-              <a:t>Value</a:t>
-            </a:r>
-            <a:r>
-              <a:rPr lang="fr-FR" i="1" u="sng" dirty="0" err="1" smtClean="0">
-                <a:solidFill>
-                  <a:schemeClr val="accent6"/>
-                </a:solidFill>
-              </a:rPr>
-              <a:t>Type</a:t>
+              <a:t>ValueType</a:t>
             </a:r>
             <a:endParaRPr lang="fr-FR" i="1" u="sng" dirty="0" smtClean="0">
               <a:solidFill>

</xml_diff>

<commit_message>
Suppression de la collection "values" dans la bdd
</commit_message>
<xml_diff>
--- a/documentation/architecture logicielle.pptx
+++ b/documentation/architecture logicielle.pptx
@@ -885,10 +885,9 @@
         <a:lstStyle/>
         <a:p>
           <a:r>
-            <a:rPr lang="fr-FR" dirty="0" smtClean="0"/>
+            <a:rPr lang="fr-FR" dirty="0"/>
             <a:t>Participation</a:t>
           </a:r>
-          <a:endParaRPr lang="fr-FR" dirty="0"/>
         </a:p>
       </dgm:t>
     </dgm:pt>
@@ -922,11 +921,11 @@
         <a:lstStyle/>
         <a:p>
           <a:r>
-            <a:rPr lang="fr-FR" dirty="0" smtClean="0"/>
+            <a:rPr lang="fr-FR" dirty="0"/>
             <a:t>Est créée lors du </a:t>
           </a:r>
           <a:r>
-            <a:rPr lang="fr-FR" dirty="0" err="1" smtClean="0"/>
+            <a:rPr lang="fr-FR" dirty="0" err="1"/>
             <a:t>scrapping</a:t>
           </a:r>
           <a:endParaRPr lang="fr-FR" dirty="0"/>
@@ -955,80 +954,6 @@
         </a:p>
       </dgm:t>
     </dgm:pt>
-    <dgm:pt modelId="{4DC467E1-1184-4819-BB46-212760A3B242}">
-      <dgm:prSet phldrT="[Texte]"/>
-      <dgm:spPr/>
-      <dgm:t>
-        <a:bodyPr/>
-        <a:lstStyle/>
-        <a:p>
-          <a:r>
-            <a:rPr lang="fr-FR" dirty="0" smtClean="0"/>
-            <a:t>Value</a:t>
-          </a:r>
-          <a:endParaRPr lang="fr-FR" dirty="0"/>
-        </a:p>
-      </dgm:t>
-    </dgm:pt>
-    <dgm:pt modelId="{375E0EF5-3754-4FEB-B295-8D0992F21A95}" type="parTrans" cxnId="{7FBE97A5-FFB6-43A6-8E65-10C1CBBB19AD}">
-      <dgm:prSet/>
-      <dgm:spPr/>
-      <dgm:t>
-        <a:bodyPr/>
-        <a:lstStyle/>
-        <a:p>
-          <a:endParaRPr lang="fr-FR"/>
-        </a:p>
-      </dgm:t>
-    </dgm:pt>
-    <dgm:pt modelId="{C39EBC41-F58D-4545-B68C-E484CF5F4927}" type="sibTrans" cxnId="{7FBE97A5-FFB6-43A6-8E65-10C1CBBB19AD}">
-      <dgm:prSet/>
-      <dgm:spPr/>
-      <dgm:t>
-        <a:bodyPr/>
-        <a:lstStyle/>
-        <a:p>
-          <a:endParaRPr lang="fr-FR"/>
-        </a:p>
-      </dgm:t>
-    </dgm:pt>
-    <dgm:pt modelId="{F5C2506A-2875-4039-86D0-830A91B659B1}">
-      <dgm:prSet phldrT="[Texte]"/>
-      <dgm:spPr/>
-      <dgm:t>
-        <a:bodyPr/>
-        <a:lstStyle/>
-        <a:p>
-          <a:r>
-            <a:rPr lang="fr-FR" dirty="0" smtClean="0"/>
-            <a:t>Est créée lors de la requête d’une valeur.</a:t>
-          </a:r>
-          <a:endParaRPr lang="fr-FR" dirty="0"/>
-        </a:p>
-      </dgm:t>
-    </dgm:pt>
-    <dgm:pt modelId="{84B41B5A-AB32-4889-9D69-3548A32450E0}" type="parTrans" cxnId="{DA9BF4D0-2660-44AB-914A-37F0A1709BD1}">
-      <dgm:prSet/>
-      <dgm:spPr/>
-      <dgm:t>
-        <a:bodyPr/>
-        <a:lstStyle/>
-        <a:p>
-          <a:endParaRPr lang="fr-FR"/>
-        </a:p>
-      </dgm:t>
-    </dgm:pt>
-    <dgm:pt modelId="{459C6175-933F-460D-B999-DA44928336B1}" type="sibTrans" cxnId="{DA9BF4D0-2660-44AB-914A-37F0A1709BD1}">
-      <dgm:prSet/>
-      <dgm:spPr/>
-      <dgm:t>
-        <a:bodyPr/>
-        <a:lstStyle/>
-        <a:p>
-          <a:endParaRPr lang="fr-FR"/>
-        </a:p>
-      </dgm:t>
-    </dgm:pt>
     <dgm:pt modelId="{5AC2733D-08BF-4115-99BD-F3FB1F511E87}">
       <dgm:prSet phldrT="[Texte]"/>
       <dgm:spPr/>
@@ -1037,11 +962,11 @@
         <a:lstStyle/>
         <a:p>
           <a:r>
-            <a:rPr lang="fr-FR" dirty="0" smtClean="0"/>
+            <a:rPr lang="fr-FR" dirty="0"/>
             <a:t>Permet de sauvegarder les éléments inhérents à la participation (nom, catégorie, temps, type de finale), les éléments relatifs à la compétition (nom course, date, niveau, phase) ainsi que les éléments du calcul de points réalisé (valeur, points). Ces infos sont sauvegardées lors du </a:t>
           </a:r>
           <a:r>
-            <a:rPr lang="fr-FR" dirty="0" err="1" smtClean="0"/>
+            <a:rPr lang="fr-FR" dirty="0" err="1"/>
             <a:t>scrapping</a:t>
           </a:r>
           <a:endParaRPr lang="fr-FR" dirty="0"/>
@@ -1078,10 +1003,9 @@
         <a:lstStyle/>
         <a:p>
           <a:r>
-            <a:rPr lang="fr-FR" dirty="0" smtClean="0"/>
+            <a:rPr lang="fr-FR" dirty="0"/>
             <a:t>Permet de sauvegarder les informations calculées pour les différents calculs de points : valeur et points</a:t>
           </a:r>
-          <a:endParaRPr lang="fr-FR" dirty="0"/>
         </a:p>
       </dgm:t>
     </dgm:pt>
@@ -1093,29 +1017,6 @@
       <dgm:prSet/>
       <dgm:spPr/>
     </dgm:pt>
-    <dgm:pt modelId="{5F510D6E-3929-45A4-BD5E-428BE47AB0D4}">
-      <dgm:prSet phldrT="[Texte]"/>
-      <dgm:spPr/>
-      <dgm:t>
-        <a:bodyPr/>
-        <a:lstStyle/>
-        <a:p>
-          <a:r>
-            <a:rPr lang="fr-FR" dirty="0" smtClean="0"/>
-            <a:t>Utilisation cible : lors de l’utilisation de l’évolution de la moyenne (métriques ou affichage)</a:t>
-          </a:r>
-          <a:endParaRPr lang="fr-FR" dirty="0"/>
-        </a:p>
-      </dgm:t>
-    </dgm:pt>
-    <dgm:pt modelId="{30A3AB8A-F5CA-4737-B58E-FABA7463CFDD}" type="parTrans" cxnId="{23CA80AA-8FA8-4101-AD96-CAFC8F99061B}">
-      <dgm:prSet/>
-      <dgm:spPr/>
-    </dgm:pt>
-    <dgm:pt modelId="{D346169C-BA54-4F9B-A217-4231B5F5F987}" type="sibTrans" cxnId="{23CA80AA-8FA8-4101-AD96-CAFC8F99061B}">
-      <dgm:prSet/>
-      <dgm:spPr/>
-    </dgm:pt>
     <dgm:pt modelId="{6AC57E1A-8322-48C0-8755-6E723587B1FC}">
       <dgm:prSet phldrT="[Texte]"/>
       <dgm:spPr/>
@@ -1124,10 +1025,9 @@
         <a:lstStyle/>
         <a:p>
           <a:r>
-            <a:rPr lang="fr-FR" dirty="0" smtClean="0"/>
+            <a:rPr lang="fr-FR" dirty="0"/>
             <a:t>Utilisation cible : lors du calcul de points, lors de l’affichage des compétitions réalisées par un athlète</a:t>
           </a:r>
-          <a:endParaRPr lang="fr-FR" dirty="0"/>
         </a:p>
       </dgm:t>
     </dgm:pt>
@@ -1158,48 +1058,6 @@
       <dgm:prSet/>
       <dgm:spPr/>
     </dgm:pt>
-    <dgm:pt modelId="{733C3F83-B08E-4475-8368-AAC181373413}">
-      <dgm:prSet phldrT="[Texte]"/>
-      <dgm:spPr/>
-      <dgm:t>
-        <a:bodyPr/>
-        <a:lstStyle/>
-        <a:p>
-          <a:endParaRPr lang="fr-FR" dirty="0"/>
-        </a:p>
-      </dgm:t>
-    </dgm:pt>
-    <dgm:pt modelId="{F66E9399-AC01-4805-9FE2-E1A9A1839D8D}" type="parTrans" cxnId="{E1FC6144-67A4-474F-AAED-C6C4F6A6CB13}">
-      <dgm:prSet/>
-      <dgm:spPr/>
-    </dgm:pt>
-    <dgm:pt modelId="{3D3DB845-F709-4847-983D-601C41E3ED08}" type="sibTrans" cxnId="{E1FC6144-67A4-474F-AAED-C6C4F6A6CB13}">
-      <dgm:prSet/>
-      <dgm:spPr/>
-    </dgm:pt>
-    <dgm:pt modelId="{58AF35E1-3987-4C10-ABEE-E5183437F34D}">
-      <dgm:prSet phldrT="[Texte]"/>
-      <dgm:spPr/>
-      <dgm:t>
-        <a:bodyPr/>
-        <a:lstStyle/>
-        <a:p>
-          <a:r>
-            <a:rPr lang="fr-FR" dirty="0" smtClean="0"/>
-            <a:t>Représente la valeur à la fin de la journée, donc après toutes les phases de la journée</a:t>
-          </a:r>
-          <a:endParaRPr lang="fr-FR" dirty="0"/>
-        </a:p>
-      </dgm:t>
-    </dgm:pt>
-    <dgm:pt modelId="{BA83D104-E3F8-415D-B535-FCE63B715295}" type="parTrans" cxnId="{BF440E8A-90BB-4638-9C3F-9224164129DC}">
-      <dgm:prSet/>
-      <dgm:spPr/>
-    </dgm:pt>
-    <dgm:pt modelId="{6FBEA9EE-FFE6-46C2-889F-853AEE1F2768}" type="sibTrans" cxnId="{BF440E8A-90BB-4638-9C3F-9224164129DC}">
-      <dgm:prSet/>
-      <dgm:spPr/>
-    </dgm:pt>
     <dgm:pt modelId="{7C1DF500-77D3-4D50-B518-AEB29184D80B}" type="pres">
       <dgm:prSet presAssocID="{200188F1-A6D4-492C-BCDF-87516FC64D91}" presName="linear" presStyleCnt="0">
         <dgm:presLayoutVars>
@@ -1208,105 +1066,41 @@
         </dgm:presLayoutVars>
       </dgm:prSet>
       <dgm:spPr/>
-      <dgm:t>
-        <a:bodyPr/>
-        <a:lstStyle/>
-        <a:p>
-          <a:endParaRPr lang="fr-FR"/>
-        </a:p>
-      </dgm:t>
     </dgm:pt>
     <dgm:pt modelId="{B07E5410-78A9-4D6D-BF5B-A06354D9BFD7}" type="pres">
-      <dgm:prSet presAssocID="{D81A5FE6-BBE3-4DC9-91D6-CD4E6E66437F}" presName="parentText" presStyleLbl="node1" presStyleIdx="0" presStyleCnt="2">
+      <dgm:prSet presAssocID="{D81A5FE6-BBE3-4DC9-91D6-CD4E6E66437F}" presName="parentText" presStyleLbl="node1" presStyleIdx="0" presStyleCnt="1">
         <dgm:presLayoutVars>
           <dgm:chMax val="0"/>
           <dgm:bulletEnabled val="1"/>
         </dgm:presLayoutVars>
       </dgm:prSet>
       <dgm:spPr/>
-      <dgm:t>
-        <a:bodyPr/>
-        <a:lstStyle/>
-        <a:p>
-          <a:endParaRPr lang="fr-FR"/>
-        </a:p>
-      </dgm:t>
     </dgm:pt>
     <dgm:pt modelId="{0CACA233-9E29-4D9B-93F2-708F46F801F6}" type="pres">
-      <dgm:prSet presAssocID="{D81A5FE6-BBE3-4DC9-91D6-CD4E6E66437F}" presName="childText" presStyleLbl="revTx" presStyleIdx="0" presStyleCnt="2">
+      <dgm:prSet presAssocID="{D81A5FE6-BBE3-4DC9-91D6-CD4E6E66437F}" presName="childText" presStyleLbl="revTx" presStyleIdx="0" presStyleCnt="1">
         <dgm:presLayoutVars>
           <dgm:bulletEnabled val="1"/>
         </dgm:presLayoutVars>
       </dgm:prSet>
       <dgm:spPr/>
-      <dgm:t>
-        <a:bodyPr/>
-        <a:lstStyle/>
-        <a:p>
-          <a:endParaRPr lang="fr-FR"/>
-        </a:p>
-      </dgm:t>
-    </dgm:pt>
-    <dgm:pt modelId="{4A6443FC-EBF7-4CCC-A9AD-BCCA75FC5EDC}" type="pres">
-      <dgm:prSet presAssocID="{4DC467E1-1184-4819-BB46-212760A3B242}" presName="parentText" presStyleLbl="node1" presStyleIdx="1" presStyleCnt="2">
-        <dgm:presLayoutVars>
-          <dgm:chMax val="0"/>
-          <dgm:bulletEnabled val="1"/>
-        </dgm:presLayoutVars>
-      </dgm:prSet>
-      <dgm:spPr/>
-      <dgm:t>
-        <a:bodyPr/>
-        <a:lstStyle/>
-        <a:p>
-          <a:endParaRPr lang="fr-FR"/>
-        </a:p>
-      </dgm:t>
-    </dgm:pt>
-    <dgm:pt modelId="{0579274B-0586-4590-B48C-749BBF717C96}" type="pres">
-      <dgm:prSet presAssocID="{4DC467E1-1184-4819-BB46-212760A3B242}" presName="childText" presStyleLbl="revTx" presStyleIdx="1" presStyleCnt="2">
-        <dgm:presLayoutVars>
-          <dgm:bulletEnabled val="1"/>
-        </dgm:presLayoutVars>
-      </dgm:prSet>
-      <dgm:spPr/>
-      <dgm:t>
-        <a:bodyPr/>
-        <a:lstStyle/>
-        <a:p>
-          <a:endParaRPr lang="fr-FR"/>
-        </a:p>
-      </dgm:t>
     </dgm:pt>
   </dgm:ptLst>
   <dgm:cxnLst>
-    <dgm:cxn modelId="{AF0C8D07-42BF-4323-9947-7A8D625CC560}" type="presOf" srcId="{58AF35E1-3987-4C10-ABEE-E5183437F34D}" destId="{0579274B-0586-4590-B48C-749BBF717C96}" srcOrd="0" destOrd="1" presId="urn:microsoft.com/office/officeart/2005/8/layout/vList2"/>
-    <dgm:cxn modelId="{9349A3BA-47FA-462A-846D-690F8C1F7AB7}" type="presOf" srcId="{4DC467E1-1184-4819-BB46-212760A3B242}" destId="{4A6443FC-EBF7-4CCC-A9AD-BCCA75FC5EDC}" srcOrd="0" destOrd="0" presId="urn:microsoft.com/office/officeart/2005/8/layout/vList2"/>
-    <dgm:cxn modelId="{D24AE90B-4087-4C2C-8A9E-7A3AB66FF5BF}" type="presOf" srcId="{733C3F83-B08E-4475-8368-AAC181373413}" destId="{0579274B-0586-4590-B48C-749BBF717C96}" srcOrd="0" destOrd="3" presId="urn:microsoft.com/office/officeart/2005/8/layout/vList2"/>
-    <dgm:cxn modelId="{23CA80AA-8FA8-4101-AD96-CAFC8F99061B}" srcId="{4DC467E1-1184-4819-BB46-212760A3B242}" destId="{5F510D6E-3929-45A4-BD5E-428BE47AB0D4}" srcOrd="2" destOrd="0" parTransId="{30A3AB8A-F5CA-4737-B58E-FABA7463CFDD}" sibTransId="{D346169C-BA54-4F9B-A217-4231B5F5F987}"/>
+    <dgm:cxn modelId="{60FC921D-7F4B-4474-B922-3B10780C36DF}" srcId="{D81A5FE6-BBE3-4DC9-91D6-CD4E6E66437F}" destId="{75B92DB3-302C-4E61-88F4-A9BD26AE6E08}" srcOrd="2" destOrd="0" parTransId="{EDE463E4-FD8B-4C2A-A556-3C04F3E65DBA}" sibTransId="{414694E6-FBDA-4ABC-A9FD-9D1A94106A03}"/>
+    <dgm:cxn modelId="{944E141E-9B02-4E2E-B423-C0673AB0E1EE}" type="presOf" srcId="{6AC57E1A-8322-48C0-8755-6E723587B1FC}" destId="{0CACA233-9E29-4D9B-93F2-708F46F801F6}" srcOrd="0" destOrd="3" presId="urn:microsoft.com/office/officeart/2005/8/layout/vList2"/>
+    <dgm:cxn modelId="{1F739D2F-1B9C-4267-9FF3-D2914A6097E2}" type="presOf" srcId="{5AC2733D-08BF-4115-99BD-F3FB1F511E87}" destId="{0CACA233-9E29-4D9B-93F2-708F46F801F6}" srcOrd="0" destOrd="1" presId="urn:microsoft.com/office/officeart/2005/8/layout/vList2"/>
+    <dgm:cxn modelId="{F353A937-DB60-42B3-9092-2D2B546CE5FA}" type="presOf" srcId="{D0542434-2A83-4D47-BEA6-AA18D4BCCB88}" destId="{0CACA233-9E29-4D9B-93F2-708F46F801F6}" srcOrd="0" destOrd="4" presId="urn:microsoft.com/office/officeart/2005/8/layout/vList2"/>
+    <dgm:cxn modelId="{9062863E-6886-4CB2-9507-F9C7DF335AB5}" type="presOf" srcId="{A14994A2-4572-466F-BA44-05EFFA04BD95}" destId="{0CACA233-9E29-4D9B-93F2-708F46F801F6}" srcOrd="0" destOrd="0" presId="urn:microsoft.com/office/officeart/2005/8/layout/vList2"/>
+    <dgm:cxn modelId="{6D967A63-A883-4DA6-AD78-97C76E8DA12F}" srcId="{D81A5FE6-BBE3-4DC9-91D6-CD4E6E66437F}" destId="{A14994A2-4572-466F-BA44-05EFFA04BD95}" srcOrd="0" destOrd="0" parTransId="{17D0A7BF-55D8-424A-BEB5-C4A6E0E9DDBC}" sibTransId="{D4761470-C4F3-4E89-A79B-011E63263C33}"/>
+    <dgm:cxn modelId="{C5150D4C-6D20-4F15-A8B9-6A09FAE454BF}" type="presOf" srcId="{75B92DB3-302C-4E61-88F4-A9BD26AE6E08}" destId="{0CACA233-9E29-4D9B-93F2-708F46F801F6}" srcOrd="0" destOrd="2" presId="urn:microsoft.com/office/officeart/2005/8/layout/vList2"/>
+    <dgm:cxn modelId="{DC974F54-14AC-4475-BD01-080C59702A28}" srcId="{D81A5FE6-BBE3-4DC9-91D6-CD4E6E66437F}" destId="{5AC2733D-08BF-4115-99BD-F3FB1F511E87}" srcOrd="1" destOrd="0" parTransId="{B55C6608-6B38-486D-AFDA-B99FAFC8B1A1}" sibTransId="{38FB9E2E-B2F4-4913-9919-02523BA4C4E9}"/>
     <dgm:cxn modelId="{B34E558D-1449-4511-BD16-1D195196895C}" srcId="{D81A5FE6-BBE3-4DC9-91D6-CD4E6E66437F}" destId="{6AC57E1A-8322-48C0-8755-6E723587B1FC}" srcOrd="3" destOrd="0" parTransId="{D4BB04EC-8228-4093-BE6D-7C89AFC000F2}" sibTransId="{C8F4FE23-72D4-4AFC-8E4A-F542BD0E3763}"/>
-    <dgm:cxn modelId="{6D967A63-A883-4DA6-AD78-97C76E8DA12F}" srcId="{D81A5FE6-BBE3-4DC9-91D6-CD4E6E66437F}" destId="{A14994A2-4572-466F-BA44-05EFFA04BD95}" srcOrd="0" destOrd="0" parTransId="{17D0A7BF-55D8-424A-BEB5-C4A6E0E9DDBC}" sibTransId="{D4761470-C4F3-4E89-A79B-011E63263C33}"/>
-    <dgm:cxn modelId="{DA9BF4D0-2660-44AB-914A-37F0A1709BD1}" srcId="{4DC467E1-1184-4819-BB46-212760A3B242}" destId="{F5C2506A-2875-4039-86D0-830A91B659B1}" srcOrd="0" destOrd="0" parTransId="{84B41B5A-AB32-4889-9D69-3548A32450E0}" sibTransId="{459C6175-933F-460D-B999-DA44928336B1}"/>
-    <dgm:cxn modelId="{BF440E8A-90BB-4638-9C3F-9224164129DC}" srcId="{4DC467E1-1184-4819-BB46-212760A3B242}" destId="{58AF35E1-3987-4C10-ABEE-E5183437F34D}" srcOrd="1" destOrd="0" parTransId="{BA83D104-E3F8-415D-B535-FCE63B715295}" sibTransId="{6FBEA9EE-FFE6-46C2-889F-853AEE1F2768}"/>
-    <dgm:cxn modelId="{DC974F54-14AC-4475-BD01-080C59702A28}" srcId="{D81A5FE6-BBE3-4DC9-91D6-CD4E6E66437F}" destId="{5AC2733D-08BF-4115-99BD-F3FB1F511E87}" srcOrd="1" destOrd="0" parTransId="{B55C6608-6B38-486D-AFDA-B99FAFC8B1A1}" sibTransId="{38FB9E2E-B2F4-4913-9919-02523BA4C4E9}"/>
-    <dgm:cxn modelId="{60FC921D-7F4B-4474-B922-3B10780C36DF}" srcId="{D81A5FE6-BBE3-4DC9-91D6-CD4E6E66437F}" destId="{75B92DB3-302C-4E61-88F4-A9BD26AE6E08}" srcOrd="2" destOrd="0" parTransId="{EDE463E4-FD8B-4C2A-A556-3C04F3E65DBA}" sibTransId="{414694E6-FBDA-4ABC-A9FD-9D1A94106A03}"/>
-    <dgm:cxn modelId="{C5150D4C-6D20-4F15-A8B9-6A09FAE454BF}" type="presOf" srcId="{75B92DB3-302C-4E61-88F4-A9BD26AE6E08}" destId="{0CACA233-9E29-4D9B-93F2-708F46F801F6}" srcOrd="0" destOrd="2" presId="urn:microsoft.com/office/officeart/2005/8/layout/vList2"/>
-    <dgm:cxn modelId="{944E141E-9B02-4E2E-B423-C0673AB0E1EE}" type="presOf" srcId="{6AC57E1A-8322-48C0-8755-6E723587B1FC}" destId="{0CACA233-9E29-4D9B-93F2-708F46F801F6}" srcOrd="0" destOrd="3" presId="urn:microsoft.com/office/officeart/2005/8/layout/vList2"/>
-    <dgm:cxn modelId="{9062863E-6886-4CB2-9507-F9C7DF335AB5}" type="presOf" srcId="{A14994A2-4572-466F-BA44-05EFFA04BD95}" destId="{0CACA233-9E29-4D9B-93F2-708F46F801F6}" srcOrd="0" destOrd="0" presId="urn:microsoft.com/office/officeart/2005/8/layout/vList2"/>
-    <dgm:cxn modelId="{E1FC6144-67A4-474F-AAED-C6C4F6A6CB13}" srcId="{4DC467E1-1184-4819-BB46-212760A3B242}" destId="{733C3F83-B08E-4475-8368-AAC181373413}" srcOrd="3" destOrd="0" parTransId="{F66E9399-AC01-4805-9FE2-E1A9A1839D8D}" sibTransId="{3D3DB845-F709-4847-983D-601C41E3ED08}"/>
-    <dgm:cxn modelId="{1F739D2F-1B9C-4267-9FF3-D2914A6097E2}" type="presOf" srcId="{5AC2733D-08BF-4115-99BD-F3FB1F511E87}" destId="{0CACA233-9E29-4D9B-93F2-708F46F801F6}" srcOrd="0" destOrd="1" presId="urn:microsoft.com/office/officeart/2005/8/layout/vList2"/>
+    <dgm:cxn modelId="{FC3D98B3-0823-4776-8B43-F6077CB9D606}" srcId="{200188F1-A6D4-492C-BCDF-87516FC64D91}" destId="{D81A5FE6-BBE3-4DC9-91D6-CD4E6E66437F}" srcOrd="0" destOrd="0" parTransId="{8869F334-3F8D-495D-8AAC-E5DD5959DC52}" sibTransId="{6E44C864-F5C4-4C5F-808A-EC357542073D}"/>
     <dgm:cxn modelId="{8F4319BA-7AD2-4F18-BD49-AFC52B06E812}" type="presOf" srcId="{D81A5FE6-BBE3-4DC9-91D6-CD4E6E66437F}" destId="{B07E5410-78A9-4D6D-BF5B-A06354D9BFD7}" srcOrd="0" destOrd="0" presId="urn:microsoft.com/office/officeart/2005/8/layout/vList2"/>
+    <dgm:cxn modelId="{D6F774E0-8B51-48BE-9631-F0B1FFD4D337}" srcId="{D81A5FE6-BBE3-4DC9-91D6-CD4E6E66437F}" destId="{D0542434-2A83-4D47-BEA6-AA18D4BCCB88}" srcOrd="4" destOrd="0" parTransId="{0C143F8B-9D55-41DA-B42D-5A49DA4956CE}" sibTransId="{4764EB9C-D759-4B58-B6E1-B8EBE0699A38}"/>
     <dgm:cxn modelId="{D0E5FCFF-C3DD-457E-9245-19439B3B069B}" type="presOf" srcId="{200188F1-A6D4-492C-BCDF-87516FC64D91}" destId="{7C1DF500-77D3-4D50-B518-AEB29184D80B}" srcOrd="0" destOrd="0" presId="urn:microsoft.com/office/officeart/2005/8/layout/vList2"/>
-    <dgm:cxn modelId="{7FBE97A5-FFB6-43A6-8E65-10C1CBBB19AD}" srcId="{200188F1-A6D4-492C-BCDF-87516FC64D91}" destId="{4DC467E1-1184-4819-BB46-212760A3B242}" srcOrd="1" destOrd="0" parTransId="{375E0EF5-3754-4FEB-B295-8D0992F21A95}" sibTransId="{C39EBC41-F58D-4545-B68C-E484CF5F4927}"/>
-    <dgm:cxn modelId="{FC3D98B3-0823-4776-8B43-F6077CB9D606}" srcId="{200188F1-A6D4-492C-BCDF-87516FC64D91}" destId="{D81A5FE6-BBE3-4DC9-91D6-CD4E6E66437F}" srcOrd="0" destOrd="0" parTransId="{8869F334-3F8D-495D-8AAC-E5DD5959DC52}" sibTransId="{6E44C864-F5C4-4C5F-808A-EC357542073D}"/>
-    <dgm:cxn modelId="{B21F8869-6909-4002-8470-262A3BCD5D16}" type="presOf" srcId="{5F510D6E-3929-45A4-BD5E-428BE47AB0D4}" destId="{0579274B-0586-4590-B48C-749BBF717C96}" srcOrd="0" destOrd="2" presId="urn:microsoft.com/office/officeart/2005/8/layout/vList2"/>
-    <dgm:cxn modelId="{110DA496-0D26-4218-9EFC-207F26DABA3F}" type="presOf" srcId="{F5C2506A-2875-4039-86D0-830A91B659B1}" destId="{0579274B-0586-4590-B48C-749BBF717C96}" srcOrd="0" destOrd="0" presId="urn:microsoft.com/office/officeart/2005/8/layout/vList2"/>
-    <dgm:cxn modelId="{F353A937-DB60-42B3-9092-2D2B546CE5FA}" type="presOf" srcId="{D0542434-2A83-4D47-BEA6-AA18D4BCCB88}" destId="{0CACA233-9E29-4D9B-93F2-708F46F801F6}" srcOrd="0" destOrd="4" presId="urn:microsoft.com/office/officeart/2005/8/layout/vList2"/>
-    <dgm:cxn modelId="{D6F774E0-8B51-48BE-9631-F0B1FFD4D337}" srcId="{D81A5FE6-BBE3-4DC9-91D6-CD4E6E66437F}" destId="{D0542434-2A83-4D47-BEA6-AA18D4BCCB88}" srcOrd="4" destOrd="0" parTransId="{0C143F8B-9D55-41DA-B42D-5A49DA4956CE}" sibTransId="{4764EB9C-D759-4B58-B6E1-B8EBE0699A38}"/>
     <dgm:cxn modelId="{F9B882E0-5202-48AB-BC5E-D66D05F8919F}" type="presParOf" srcId="{7C1DF500-77D3-4D50-B518-AEB29184D80B}" destId="{B07E5410-78A9-4D6D-BF5B-A06354D9BFD7}" srcOrd="0" destOrd="0" presId="urn:microsoft.com/office/officeart/2005/8/layout/vList2"/>
     <dgm:cxn modelId="{302A7AEA-A1C8-4F9D-AE22-708CE2B71263}" type="presParOf" srcId="{7C1DF500-77D3-4D50-B518-AEB29184D80B}" destId="{0CACA233-9E29-4D9B-93F2-708F46F801F6}" srcOrd="1" destOrd="0" presId="urn:microsoft.com/office/officeart/2005/8/layout/vList2"/>
-    <dgm:cxn modelId="{2E4374C9-BC35-4E54-B443-9EB19F477437}" type="presParOf" srcId="{7C1DF500-77D3-4D50-B518-AEB29184D80B}" destId="{4A6443FC-EBF7-4CCC-A9AD-BCCA75FC5EDC}" srcOrd="2" destOrd="0" presId="urn:microsoft.com/office/officeart/2005/8/layout/vList2"/>
-    <dgm:cxn modelId="{4E60A0DA-1861-4515-B03A-A30A7D8EAF56}" type="presParOf" srcId="{7C1DF500-77D3-4D50-B518-AEB29184D80B}" destId="{0579274B-0586-4590-B48C-749BBF717C96}" srcOrd="3" destOrd="0" presId="urn:microsoft.com/office/officeart/2005/8/layout/vList2"/>
   </dgm:cxnLst>
   <dgm:bg/>
   <dgm:whole/>
@@ -1333,8 +1127,8 @@
       </dsp:nvSpPr>
       <dsp:spPr>
         <a:xfrm>
-          <a:off x="0" y="896"/>
-          <a:ext cx="10874104" cy="599625"/>
+          <a:off x="0" y="59351"/>
+          <a:ext cx="10874104" cy="791505"/>
         </a:xfrm>
         <a:prstGeom prst="roundRect">
           <a:avLst/>
@@ -1376,12 +1170,12 @@
         </a:fontRef>
       </dsp:style>
       <dsp:txBody>
-        <a:bodyPr spcFirstLastPara="0" vert="horz" wrap="square" lIns="95250" tIns="95250" rIns="95250" bIns="95250" numCol="1" spcCol="1270" anchor="ctr" anchorCtr="0">
+        <a:bodyPr spcFirstLastPara="0" vert="horz" wrap="square" lIns="125730" tIns="125730" rIns="125730" bIns="125730" numCol="1" spcCol="1270" anchor="ctr" anchorCtr="0">
           <a:noAutofit/>
         </a:bodyPr>
         <a:lstStyle/>
         <a:p>
-          <a:pPr lvl="0" algn="l" defTabSz="1111250">
+          <a:pPr marL="0" lvl="0" indent="0" algn="l" defTabSz="1466850">
             <a:lnSpc>
               <a:spcPct val="90000"/>
             </a:lnSpc>
@@ -1391,17 +1185,17 @@
             <a:spcAft>
               <a:spcPct val="35000"/>
             </a:spcAft>
+            <a:buNone/>
           </a:pPr>
           <a:r>
-            <a:rPr lang="fr-FR" sz="2500" kern="1200" dirty="0" smtClean="0"/>
+            <a:rPr lang="fr-FR" sz="3300" kern="1200" dirty="0"/>
             <a:t>Participation</a:t>
           </a:r>
-          <a:endParaRPr lang="fr-FR" sz="2500" kern="1200" dirty="0"/>
         </a:p>
       </dsp:txBody>
       <dsp:txXfrm>
-        <a:off x="29271" y="30167"/>
-        <a:ext cx="10815562" cy="541083"/>
+        <a:off x="38638" y="97989"/>
+        <a:ext cx="10796828" cy="714229"/>
       </dsp:txXfrm>
     </dsp:sp>
     <dsp:sp modelId="{0CACA233-9E29-4D9B-93F2-708F46F801F6}">
@@ -1411,8 +1205,8 @@
       </dsp:nvSpPr>
       <dsp:spPr>
         <a:xfrm>
-          <a:off x="0" y="600521"/>
-          <a:ext cx="10874104" cy="2846250"/>
+          <a:off x="0" y="850856"/>
+          <a:ext cx="10874104" cy="4508460"/>
         </a:xfrm>
         <a:prstGeom prst="rect">
           <a:avLst/>
@@ -1436,12 +1230,12 @@
         <a:fontRef idx="minor"/>
       </dsp:style>
       <dsp:txBody>
-        <a:bodyPr spcFirstLastPara="0" vert="horz" wrap="square" lIns="345253" tIns="31750" rIns="177800" bIns="31750" numCol="1" spcCol="1270" anchor="t" anchorCtr="0">
+        <a:bodyPr spcFirstLastPara="0" vert="horz" wrap="square" lIns="345253" tIns="41910" rIns="234696" bIns="41910" numCol="1" spcCol="1270" anchor="t" anchorCtr="0">
           <a:noAutofit/>
         </a:bodyPr>
         <a:lstStyle/>
         <a:p>
-          <a:pPr marL="228600" lvl="1" indent="-228600" algn="l" defTabSz="889000">
+          <a:pPr marL="228600" lvl="1" indent="-228600" algn="l" defTabSz="1155700">
             <a:lnSpc>
               <a:spcPct val="90000"/>
             </a:lnSpc>
@@ -1451,20 +1245,20 @@
             <a:spcAft>
               <a:spcPct val="20000"/>
             </a:spcAft>
-            <a:buChar char="••"/>
+            <a:buChar char="•"/>
           </a:pPr>
           <a:r>
-            <a:rPr lang="fr-FR" sz="2000" kern="1200" dirty="0" smtClean="0"/>
+            <a:rPr lang="fr-FR" sz="2600" kern="1200" dirty="0"/>
             <a:t>Est créée lors du </a:t>
           </a:r>
           <a:r>
-            <a:rPr lang="fr-FR" sz="2000" kern="1200" dirty="0" err="1" smtClean="0"/>
+            <a:rPr lang="fr-FR" sz="2600" kern="1200" dirty="0" err="1"/>
             <a:t>scrapping</a:t>
           </a:r>
-          <a:endParaRPr lang="fr-FR" sz="2000" kern="1200" dirty="0"/>
+          <a:endParaRPr lang="fr-FR" sz="2600" kern="1200" dirty="0"/>
         </a:p>
         <a:p>
-          <a:pPr marL="228600" lvl="1" indent="-228600" algn="l" defTabSz="889000">
+          <a:pPr marL="228600" lvl="1" indent="-228600" algn="l" defTabSz="1155700">
             <a:lnSpc>
               <a:spcPct val="90000"/>
             </a:lnSpc>
@@ -1474,20 +1268,20 @@
             <a:spcAft>
               <a:spcPct val="20000"/>
             </a:spcAft>
-            <a:buChar char="••"/>
+            <a:buChar char="•"/>
           </a:pPr>
           <a:r>
-            <a:rPr lang="fr-FR" sz="2000" kern="1200" dirty="0" smtClean="0"/>
+            <a:rPr lang="fr-FR" sz="2600" kern="1200" dirty="0"/>
             <a:t>Permet de sauvegarder les éléments inhérents à la participation (nom, catégorie, temps, type de finale), les éléments relatifs à la compétition (nom course, date, niveau, phase) ainsi que les éléments du calcul de points réalisé (valeur, points). Ces infos sont sauvegardées lors du </a:t>
           </a:r>
           <a:r>
-            <a:rPr lang="fr-FR" sz="2000" kern="1200" dirty="0" err="1" smtClean="0"/>
+            <a:rPr lang="fr-FR" sz="2600" kern="1200" dirty="0" err="1"/>
             <a:t>scrapping</a:t>
           </a:r>
-          <a:endParaRPr lang="fr-FR" sz="2000" kern="1200" dirty="0"/>
+          <a:endParaRPr lang="fr-FR" sz="2600" kern="1200" dirty="0"/>
         </a:p>
         <a:p>
-          <a:pPr marL="228600" lvl="1" indent="-228600" algn="l" defTabSz="889000">
+          <a:pPr marL="228600" lvl="1" indent="-228600" algn="l" defTabSz="1155700">
             <a:lnSpc>
               <a:spcPct val="90000"/>
             </a:lnSpc>
@@ -1497,16 +1291,15 @@
             <a:spcAft>
               <a:spcPct val="20000"/>
             </a:spcAft>
-            <a:buChar char="••"/>
+            <a:buChar char="•"/>
           </a:pPr>
           <a:r>
-            <a:rPr lang="fr-FR" sz="2000" kern="1200" dirty="0" smtClean="0"/>
+            <a:rPr lang="fr-FR" sz="2600" kern="1200" dirty="0"/>
             <a:t>Permet de sauvegarder les informations calculées pour les différents calculs de points : valeur et points</a:t>
           </a:r>
-          <a:endParaRPr lang="fr-FR" sz="2000" kern="1200" dirty="0"/>
         </a:p>
         <a:p>
-          <a:pPr marL="228600" lvl="1" indent="-228600" algn="l" defTabSz="889000">
+          <a:pPr marL="228600" lvl="1" indent="-228600" algn="l" defTabSz="1155700">
             <a:lnSpc>
               <a:spcPct val="90000"/>
             </a:lnSpc>
@@ -1516,16 +1309,15 @@
             <a:spcAft>
               <a:spcPct val="20000"/>
             </a:spcAft>
-            <a:buChar char="••"/>
+            <a:buChar char="•"/>
           </a:pPr>
           <a:r>
-            <a:rPr lang="fr-FR" sz="2000" kern="1200" dirty="0" smtClean="0"/>
+            <a:rPr lang="fr-FR" sz="2600" kern="1200" dirty="0"/>
             <a:t>Utilisation cible : lors du calcul de points, lors de l’affichage des compétitions réalisées par un athlète</a:t>
           </a:r>
-          <a:endParaRPr lang="fr-FR" sz="2000" kern="1200" dirty="0"/>
         </a:p>
         <a:p>
-          <a:pPr marL="228600" lvl="1" indent="-228600" algn="l" defTabSz="889000">
+          <a:pPr marL="228600" lvl="1" indent="-228600" algn="l" defTabSz="1155700">
             <a:lnSpc>
               <a:spcPct val="90000"/>
             </a:lnSpc>
@@ -1535,206 +1327,14 @@
             <a:spcAft>
               <a:spcPct val="20000"/>
             </a:spcAft>
-            <a:buChar char="••"/>
+            <a:buChar char="•"/>
           </a:pPr>
-          <a:endParaRPr lang="fr-FR" sz="2000" kern="1200" dirty="0"/>
+          <a:endParaRPr lang="fr-FR" sz="2600" kern="1200" dirty="0"/>
         </a:p>
       </dsp:txBody>
       <dsp:txXfrm>
-        <a:off x="0" y="600521"/>
-        <a:ext cx="10874104" cy="2846250"/>
-      </dsp:txXfrm>
-    </dsp:sp>
-    <dsp:sp modelId="{4A6443FC-EBF7-4CCC-A9AD-BCCA75FC5EDC}">
-      <dsp:nvSpPr>
-        <dsp:cNvPr id="0" name=""/>
-        <dsp:cNvSpPr/>
-      </dsp:nvSpPr>
-      <dsp:spPr>
-        <a:xfrm>
-          <a:off x="0" y="3446771"/>
-          <a:ext cx="10874104" cy="599625"/>
-        </a:xfrm>
-        <a:prstGeom prst="roundRect">
-          <a:avLst/>
-        </a:prstGeom>
-        <a:solidFill>
-          <a:schemeClr val="accent1">
-            <a:hueOff val="0"/>
-            <a:satOff val="0"/>
-            <a:lumOff val="0"/>
-            <a:alphaOff val="0"/>
-          </a:schemeClr>
-        </a:solidFill>
-        <a:ln w="12700" cap="flat" cmpd="sng" algn="ctr">
-          <a:solidFill>
-            <a:schemeClr val="lt1">
-              <a:hueOff val="0"/>
-              <a:satOff val="0"/>
-              <a:lumOff val="0"/>
-              <a:alphaOff val="0"/>
-            </a:schemeClr>
-          </a:solidFill>
-          <a:prstDash val="solid"/>
-          <a:miter lim="800000"/>
-        </a:ln>
-        <a:effectLst/>
-      </dsp:spPr>
-      <dsp:style>
-        <a:lnRef idx="2">
-          <a:scrgbClr r="0" g="0" b="0"/>
-        </a:lnRef>
-        <a:fillRef idx="1">
-          <a:scrgbClr r="0" g="0" b="0"/>
-        </a:fillRef>
-        <a:effectRef idx="0">
-          <a:scrgbClr r="0" g="0" b="0"/>
-        </a:effectRef>
-        <a:fontRef idx="minor">
-          <a:schemeClr val="lt1"/>
-        </a:fontRef>
-      </dsp:style>
-      <dsp:txBody>
-        <a:bodyPr spcFirstLastPara="0" vert="horz" wrap="square" lIns="95250" tIns="95250" rIns="95250" bIns="95250" numCol="1" spcCol="1270" anchor="ctr" anchorCtr="0">
-          <a:noAutofit/>
-        </a:bodyPr>
-        <a:lstStyle/>
-        <a:p>
-          <a:pPr lvl="0" algn="l" defTabSz="1111250">
-            <a:lnSpc>
-              <a:spcPct val="90000"/>
-            </a:lnSpc>
-            <a:spcBef>
-              <a:spcPct val="0"/>
-            </a:spcBef>
-            <a:spcAft>
-              <a:spcPct val="35000"/>
-            </a:spcAft>
-          </a:pPr>
-          <a:r>
-            <a:rPr lang="fr-FR" sz="2500" kern="1200" dirty="0" smtClean="0"/>
-            <a:t>Value</a:t>
-          </a:r>
-          <a:endParaRPr lang="fr-FR" sz="2500" kern="1200" dirty="0"/>
-        </a:p>
-      </dsp:txBody>
-      <dsp:txXfrm>
-        <a:off x="29271" y="3476042"/>
-        <a:ext cx="10815562" cy="541083"/>
-      </dsp:txXfrm>
-    </dsp:sp>
-    <dsp:sp modelId="{0579274B-0586-4590-B48C-749BBF717C96}">
-      <dsp:nvSpPr>
-        <dsp:cNvPr id="0" name=""/>
-        <dsp:cNvSpPr/>
-      </dsp:nvSpPr>
-      <dsp:spPr>
-        <a:xfrm>
-          <a:off x="0" y="4046396"/>
-          <a:ext cx="10874104" cy="1371375"/>
-        </a:xfrm>
-        <a:prstGeom prst="rect">
-          <a:avLst/>
-        </a:prstGeom>
-        <a:noFill/>
-        <a:ln>
-          <a:noFill/>
-        </a:ln>
-        <a:effectLst/>
-      </dsp:spPr>
-      <dsp:style>
-        <a:lnRef idx="0">
-          <a:scrgbClr r="0" g="0" b="0"/>
-        </a:lnRef>
-        <a:fillRef idx="0">
-          <a:scrgbClr r="0" g="0" b="0"/>
-        </a:fillRef>
-        <a:effectRef idx="0">
-          <a:scrgbClr r="0" g="0" b="0"/>
-        </a:effectRef>
-        <a:fontRef idx="minor"/>
-      </dsp:style>
-      <dsp:txBody>
-        <a:bodyPr spcFirstLastPara="0" vert="horz" wrap="square" lIns="345253" tIns="31750" rIns="177800" bIns="31750" numCol="1" spcCol="1270" anchor="t" anchorCtr="0">
-          <a:noAutofit/>
-        </a:bodyPr>
-        <a:lstStyle/>
-        <a:p>
-          <a:pPr marL="228600" lvl="1" indent="-228600" algn="l" defTabSz="889000">
-            <a:lnSpc>
-              <a:spcPct val="90000"/>
-            </a:lnSpc>
-            <a:spcBef>
-              <a:spcPct val="0"/>
-            </a:spcBef>
-            <a:spcAft>
-              <a:spcPct val="20000"/>
-            </a:spcAft>
-            <a:buChar char="••"/>
-          </a:pPr>
-          <a:r>
-            <a:rPr lang="fr-FR" sz="2000" kern="1200" dirty="0" smtClean="0"/>
-            <a:t>Est créée lors de la requête d’une valeur.</a:t>
-          </a:r>
-          <a:endParaRPr lang="fr-FR" sz="2000" kern="1200" dirty="0"/>
-        </a:p>
-        <a:p>
-          <a:pPr marL="228600" lvl="1" indent="-228600" algn="l" defTabSz="889000">
-            <a:lnSpc>
-              <a:spcPct val="90000"/>
-            </a:lnSpc>
-            <a:spcBef>
-              <a:spcPct val="0"/>
-            </a:spcBef>
-            <a:spcAft>
-              <a:spcPct val="20000"/>
-            </a:spcAft>
-            <a:buChar char="••"/>
-          </a:pPr>
-          <a:r>
-            <a:rPr lang="fr-FR" sz="2000" kern="1200" dirty="0" smtClean="0"/>
-            <a:t>Représente la valeur à la fin de la journée, donc après toutes les phases de la journée</a:t>
-          </a:r>
-          <a:endParaRPr lang="fr-FR" sz="2000" kern="1200" dirty="0"/>
-        </a:p>
-        <a:p>
-          <a:pPr marL="228600" lvl="1" indent="-228600" algn="l" defTabSz="889000">
-            <a:lnSpc>
-              <a:spcPct val="90000"/>
-            </a:lnSpc>
-            <a:spcBef>
-              <a:spcPct val="0"/>
-            </a:spcBef>
-            <a:spcAft>
-              <a:spcPct val="20000"/>
-            </a:spcAft>
-            <a:buChar char="••"/>
-          </a:pPr>
-          <a:r>
-            <a:rPr lang="fr-FR" sz="2000" kern="1200" dirty="0" smtClean="0"/>
-            <a:t>Utilisation cible : lors de l’utilisation de l’évolution de la moyenne (métriques ou affichage)</a:t>
-          </a:r>
-          <a:endParaRPr lang="fr-FR" sz="2000" kern="1200" dirty="0"/>
-        </a:p>
-        <a:p>
-          <a:pPr marL="228600" lvl="1" indent="-228600" algn="l" defTabSz="889000">
-            <a:lnSpc>
-              <a:spcPct val="90000"/>
-            </a:lnSpc>
-            <a:spcBef>
-              <a:spcPct val="0"/>
-            </a:spcBef>
-            <a:spcAft>
-              <a:spcPct val="20000"/>
-            </a:spcAft>
-            <a:buChar char="••"/>
-          </a:pPr>
-          <a:endParaRPr lang="fr-FR" sz="2000" kern="1200" dirty="0"/>
-        </a:p>
-      </dsp:txBody>
-      <dsp:txXfrm>
-        <a:off x="0" y="4046396"/>
-        <a:ext cx="10874104" cy="1371375"/>
+        <a:off x="0" y="850856"/>
+        <a:ext cx="10874104" cy="4508460"/>
       </dsp:txXfrm>
     </dsp:sp>
   </dsp:spTree>
@@ -2984,10 +2584,9 @@
           </a:lstStyle>
           <a:p>
             <a:r>
-              <a:rPr lang="fr-FR" smtClean="0"/>
+              <a:rPr lang="fr-FR"/>
               <a:t>Modifiez le style du titre</a:t>
             </a:r>
-            <a:endParaRPr lang="fr-FR"/>
           </a:p>
         </p:txBody>
       </p:sp>
@@ -3049,10 +2648,9 @@
           </a:lstStyle>
           <a:p>
             <a:r>
-              <a:rPr lang="fr-FR" smtClean="0"/>
+              <a:rPr lang="fr-FR"/>
               <a:t>Modifier le style des sous-titres du masque</a:t>
             </a:r>
-            <a:endParaRPr lang="fr-FR"/>
           </a:p>
         </p:txBody>
       </p:sp>
@@ -3073,7 +2671,7 @@
           <a:p>
             <a:fld id="{090BB305-B547-43E9-A3C0-FBFA669CED81}" type="datetimeFigureOut">
               <a:rPr lang="fr-FR" smtClean="0"/>
-              <a:t>06/12/2021</a:t>
+              <a:t>18/12/2021</a:t>
             </a:fld>
             <a:endParaRPr lang="fr-FR"/>
           </a:p>
@@ -3167,10 +2765,9 @@
           <a:lstStyle/>
           <a:p>
             <a:r>
-              <a:rPr lang="fr-FR" smtClean="0"/>
+              <a:rPr lang="fr-FR"/>
               <a:t>Modifiez le style du titre</a:t>
             </a:r>
-            <a:endParaRPr lang="fr-FR"/>
           </a:p>
         </p:txBody>
       </p:sp>
@@ -3191,38 +2788,37 @@
           <a:p>
             <a:pPr lvl="0"/>
             <a:r>
-              <a:rPr lang="fr-FR" smtClean="0"/>
+              <a:rPr lang="fr-FR"/>
               <a:t>Modifier les styles du texte du masque</a:t>
             </a:r>
           </a:p>
           <a:p>
             <a:pPr lvl="1"/>
             <a:r>
-              <a:rPr lang="fr-FR" smtClean="0"/>
+              <a:rPr lang="fr-FR"/>
               <a:t>Deuxième niveau</a:t>
             </a:r>
           </a:p>
           <a:p>
             <a:pPr lvl="2"/>
             <a:r>
-              <a:rPr lang="fr-FR" smtClean="0"/>
+              <a:rPr lang="fr-FR"/>
               <a:t>Troisième niveau</a:t>
             </a:r>
           </a:p>
           <a:p>
             <a:pPr lvl="3"/>
             <a:r>
-              <a:rPr lang="fr-FR" smtClean="0"/>
+              <a:rPr lang="fr-FR"/>
               <a:t>Quatrième niveau</a:t>
             </a:r>
           </a:p>
           <a:p>
             <a:pPr lvl="4"/>
             <a:r>
-              <a:rPr lang="fr-FR" smtClean="0"/>
+              <a:rPr lang="fr-FR"/>
               <a:t>Cinquième niveau</a:t>
             </a:r>
-            <a:endParaRPr lang="fr-FR"/>
           </a:p>
         </p:txBody>
       </p:sp>
@@ -3243,7 +2839,7 @@
           <a:p>
             <a:fld id="{090BB305-B547-43E9-A3C0-FBFA669CED81}" type="datetimeFigureOut">
               <a:rPr lang="fr-FR" smtClean="0"/>
-              <a:t>06/12/2021</a:t>
+              <a:t>18/12/2021</a:t>
             </a:fld>
             <a:endParaRPr lang="fr-FR"/>
           </a:p>
@@ -3342,10 +2938,9 @@
           <a:lstStyle/>
           <a:p>
             <a:r>
-              <a:rPr lang="fr-FR" smtClean="0"/>
+              <a:rPr lang="fr-FR"/>
               <a:t>Modifiez le style du titre</a:t>
             </a:r>
-            <a:endParaRPr lang="fr-FR"/>
           </a:p>
         </p:txBody>
       </p:sp>
@@ -3371,38 +2966,37 @@
           <a:p>
             <a:pPr lvl="0"/>
             <a:r>
-              <a:rPr lang="fr-FR" smtClean="0"/>
+              <a:rPr lang="fr-FR"/>
               <a:t>Modifier les styles du texte du masque</a:t>
             </a:r>
           </a:p>
           <a:p>
             <a:pPr lvl="1"/>
             <a:r>
-              <a:rPr lang="fr-FR" smtClean="0"/>
+              <a:rPr lang="fr-FR"/>
               <a:t>Deuxième niveau</a:t>
             </a:r>
           </a:p>
           <a:p>
             <a:pPr lvl="2"/>
             <a:r>
-              <a:rPr lang="fr-FR" smtClean="0"/>
+              <a:rPr lang="fr-FR"/>
               <a:t>Troisième niveau</a:t>
             </a:r>
           </a:p>
           <a:p>
             <a:pPr lvl="3"/>
             <a:r>
-              <a:rPr lang="fr-FR" smtClean="0"/>
+              <a:rPr lang="fr-FR"/>
               <a:t>Quatrième niveau</a:t>
             </a:r>
           </a:p>
           <a:p>
             <a:pPr lvl="4"/>
             <a:r>
-              <a:rPr lang="fr-FR" smtClean="0"/>
+              <a:rPr lang="fr-FR"/>
               <a:t>Cinquième niveau</a:t>
             </a:r>
-            <a:endParaRPr lang="fr-FR"/>
           </a:p>
         </p:txBody>
       </p:sp>
@@ -3423,7 +3017,7 @@
           <a:p>
             <a:fld id="{090BB305-B547-43E9-A3C0-FBFA669CED81}" type="datetimeFigureOut">
               <a:rPr lang="fr-FR" smtClean="0"/>
-              <a:t>06/12/2021</a:t>
+              <a:t>18/12/2021</a:t>
             </a:fld>
             <a:endParaRPr lang="fr-FR"/>
           </a:p>
@@ -3517,10 +3111,9 @@
           <a:lstStyle/>
           <a:p>
             <a:r>
-              <a:rPr lang="fr-FR" smtClean="0"/>
+              <a:rPr lang="fr-FR"/>
               <a:t>Modifiez le style du titre</a:t>
             </a:r>
-            <a:endParaRPr lang="fr-FR"/>
           </a:p>
         </p:txBody>
       </p:sp>
@@ -3541,38 +3134,37 @@
           <a:p>
             <a:pPr lvl="0"/>
             <a:r>
-              <a:rPr lang="fr-FR" smtClean="0"/>
+              <a:rPr lang="fr-FR"/>
               <a:t>Modifier les styles du texte du masque</a:t>
             </a:r>
           </a:p>
           <a:p>
             <a:pPr lvl="1"/>
             <a:r>
-              <a:rPr lang="fr-FR" smtClean="0"/>
+              <a:rPr lang="fr-FR"/>
               <a:t>Deuxième niveau</a:t>
             </a:r>
           </a:p>
           <a:p>
             <a:pPr lvl="2"/>
             <a:r>
-              <a:rPr lang="fr-FR" smtClean="0"/>
+              <a:rPr lang="fr-FR"/>
               <a:t>Troisième niveau</a:t>
             </a:r>
           </a:p>
           <a:p>
             <a:pPr lvl="3"/>
             <a:r>
-              <a:rPr lang="fr-FR" smtClean="0"/>
+              <a:rPr lang="fr-FR"/>
               <a:t>Quatrième niveau</a:t>
             </a:r>
           </a:p>
           <a:p>
             <a:pPr lvl="4"/>
             <a:r>
-              <a:rPr lang="fr-FR" smtClean="0"/>
+              <a:rPr lang="fr-FR"/>
               <a:t>Cinquième niveau</a:t>
             </a:r>
-            <a:endParaRPr lang="fr-FR"/>
           </a:p>
         </p:txBody>
       </p:sp>
@@ -3593,7 +3185,7 @@
           <a:p>
             <a:fld id="{090BB305-B547-43E9-A3C0-FBFA669CED81}" type="datetimeFigureOut">
               <a:rPr lang="fr-FR" smtClean="0"/>
-              <a:t>06/12/2021</a:t>
+              <a:t>18/12/2021</a:t>
             </a:fld>
             <a:endParaRPr lang="fr-FR"/>
           </a:p>
@@ -3696,10 +3288,9 @@
           </a:lstStyle>
           <a:p>
             <a:r>
-              <a:rPr lang="fr-FR" smtClean="0"/>
+              <a:rPr lang="fr-FR"/>
               <a:t>Modifiez le style du titre</a:t>
             </a:r>
-            <a:endParaRPr lang="fr-FR"/>
           </a:p>
         </p:txBody>
       </p:sp>
@@ -3816,7 +3407,7 @@
           <a:p>
             <a:pPr lvl="0"/>
             <a:r>
-              <a:rPr lang="fr-FR" smtClean="0"/>
+              <a:rPr lang="fr-FR"/>
               <a:t>Modifier les styles du texte du masque</a:t>
             </a:r>
           </a:p>
@@ -3839,7 +3430,7 @@
           <a:p>
             <a:fld id="{090BB305-B547-43E9-A3C0-FBFA669CED81}" type="datetimeFigureOut">
               <a:rPr lang="fr-FR" smtClean="0"/>
-              <a:t>06/12/2021</a:t>
+              <a:t>18/12/2021</a:t>
             </a:fld>
             <a:endParaRPr lang="fr-FR"/>
           </a:p>
@@ -3933,10 +3524,9 @@
           <a:lstStyle/>
           <a:p>
             <a:r>
-              <a:rPr lang="fr-FR" smtClean="0"/>
+              <a:rPr lang="fr-FR"/>
               <a:t>Modifiez le style du titre</a:t>
             </a:r>
-            <a:endParaRPr lang="fr-FR"/>
           </a:p>
         </p:txBody>
       </p:sp>
@@ -3962,38 +3552,37 @@
           <a:p>
             <a:pPr lvl="0"/>
             <a:r>
-              <a:rPr lang="fr-FR" smtClean="0"/>
+              <a:rPr lang="fr-FR"/>
               <a:t>Modifier les styles du texte du masque</a:t>
             </a:r>
           </a:p>
           <a:p>
             <a:pPr lvl="1"/>
             <a:r>
-              <a:rPr lang="fr-FR" smtClean="0"/>
+              <a:rPr lang="fr-FR"/>
               <a:t>Deuxième niveau</a:t>
             </a:r>
           </a:p>
           <a:p>
             <a:pPr lvl="2"/>
             <a:r>
-              <a:rPr lang="fr-FR" smtClean="0"/>
+              <a:rPr lang="fr-FR"/>
               <a:t>Troisième niveau</a:t>
             </a:r>
           </a:p>
           <a:p>
             <a:pPr lvl="3"/>
             <a:r>
-              <a:rPr lang="fr-FR" smtClean="0"/>
+              <a:rPr lang="fr-FR"/>
               <a:t>Quatrième niveau</a:t>
             </a:r>
           </a:p>
           <a:p>
             <a:pPr lvl="4"/>
             <a:r>
-              <a:rPr lang="fr-FR" smtClean="0"/>
+              <a:rPr lang="fr-FR"/>
               <a:t>Cinquième niveau</a:t>
             </a:r>
-            <a:endParaRPr lang="fr-FR"/>
           </a:p>
         </p:txBody>
       </p:sp>
@@ -4019,38 +3608,37 @@
           <a:p>
             <a:pPr lvl="0"/>
             <a:r>
-              <a:rPr lang="fr-FR" smtClean="0"/>
+              <a:rPr lang="fr-FR"/>
               <a:t>Modifier les styles du texte du masque</a:t>
             </a:r>
           </a:p>
           <a:p>
             <a:pPr lvl="1"/>
             <a:r>
-              <a:rPr lang="fr-FR" smtClean="0"/>
+              <a:rPr lang="fr-FR"/>
               <a:t>Deuxième niveau</a:t>
             </a:r>
           </a:p>
           <a:p>
             <a:pPr lvl="2"/>
             <a:r>
-              <a:rPr lang="fr-FR" smtClean="0"/>
+              <a:rPr lang="fr-FR"/>
               <a:t>Troisième niveau</a:t>
             </a:r>
           </a:p>
           <a:p>
             <a:pPr lvl="3"/>
             <a:r>
-              <a:rPr lang="fr-FR" smtClean="0"/>
+              <a:rPr lang="fr-FR"/>
               <a:t>Quatrième niveau</a:t>
             </a:r>
           </a:p>
           <a:p>
             <a:pPr lvl="4"/>
             <a:r>
-              <a:rPr lang="fr-FR" smtClean="0"/>
+              <a:rPr lang="fr-FR"/>
               <a:t>Cinquième niveau</a:t>
             </a:r>
-            <a:endParaRPr lang="fr-FR"/>
           </a:p>
         </p:txBody>
       </p:sp>
@@ -4071,7 +3659,7 @@
           <a:p>
             <a:fld id="{090BB305-B547-43E9-A3C0-FBFA669CED81}" type="datetimeFigureOut">
               <a:rPr lang="fr-FR" smtClean="0"/>
-              <a:t>06/12/2021</a:t>
+              <a:t>18/12/2021</a:t>
             </a:fld>
             <a:endParaRPr lang="fr-FR"/>
           </a:p>
@@ -4170,10 +3758,9 @@
           <a:lstStyle/>
           <a:p>
             <a:r>
-              <a:rPr lang="fr-FR" smtClean="0"/>
+              <a:rPr lang="fr-FR"/>
               <a:t>Modifiez le style du titre</a:t>
             </a:r>
-            <a:endParaRPr lang="fr-FR"/>
           </a:p>
         </p:txBody>
       </p:sp>
@@ -4236,7 +3823,7 @@
           <a:p>
             <a:pPr lvl="0"/>
             <a:r>
-              <a:rPr lang="fr-FR" smtClean="0"/>
+              <a:rPr lang="fr-FR"/>
               <a:t>Modifier les styles du texte du masque</a:t>
             </a:r>
           </a:p>
@@ -4264,38 +3851,37 @@
           <a:p>
             <a:pPr lvl="0"/>
             <a:r>
-              <a:rPr lang="fr-FR" smtClean="0"/>
+              <a:rPr lang="fr-FR"/>
               <a:t>Modifier les styles du texte du masque</a:t>
             </a:r>
           </a:p>
           <a:p>
             <a:pPr lvl="1"/>
             <a:r>
-              <a:rPr lang="fr-FR" smtClean="0"/>
+              <a:rPr lang="fr-FR"/>
               <a:t>Deuxième niveau</a:t>
             </a:r>
           </a:p>
           <a:p>
             <a:pPr lvl="2"/>
             <a:r>
-              <a:rPr lang="fr-FR" smtClean="0"/>
+              <a:rPr lang="fr-FR"/>
               <a:t>Troisième niveau</a:t>
             </a:r>
           </a:p>
           <a:p>
             <a:pPr lvl="3"/>
             <a:r>
-              <a:rPr lang="fr-FR" smtClean="0"/>
+              <a:rPr lang="fr-FR"/>
               <a:t>Quatrième niveau</a:t>
             </a:r>
           </a:p>
           <a:p>
             <a:pPr lvl="4"/>
             <a:r>
-              <a:rPr lang="fr-FR" smtClean="0"/>
+              <a:rPr lang="fr-FR"/>
               <a:t>Cinquième niveau</a:t>
             </a:r>
-            <a:endParaRPr lang="fr-FR"/>
           </a:p>
         </p:txBody>
       </p:sp>
@@ -4358,7 +3944,7 @@
           <a:p>
             <a:pPr lvl="0"/>
             <a:r>
-              <a:rPr lang="fr-FR" smtClean="0"/>
+              <a:rPr lang="fr-FR"/>
               <a:t>Modifier les styles du texte du masque</a:t>
             </a:r>
           </a:p>
@@ -4386,38 +3972,37 @@
           <a:p>
             <a:pPr lvl="0"/>
             <a:r>
-              <a:rPr lang="fr-FR" smtClean="0"/>
+              <a:rPr lang="fr-FR"/>
               <a:t>Modifier les styles du texte du masque</a:t>
             </a:r>
           </a:p>
           <a:p>
             <a:pPr lvl="1"/>
             <a:r>
-              <a:rPr lang="fr-FR" smtClean="0"/>
+              <a:rPr lang="fr-FR"/>
               <a:t>Deuxième niveau</a:t>
             </a:r>
           </a:p>
           <a:p>
             <a:pPr lvl="2"/>
             <a:r>
-              <a:rPr lang="fr-FR" smtClean="0"/>
+              <a:rPr lang="fr-FR"/>
               <a:t>Troisième niveau</a:t>
             </a:r>
           </a:p>
           <a:p>
             <a:pPr lvl="3"/>
             <a:r>
-              <a:rPr lang="fr-FR" smtClean="0"/>
+              <a:rPr lang="fr-FR"/>
               <a:t>Quatrième niveau</a:t>
             </a:r>
           </a:p>
           <a:p>
             <a:pPr lvl="4"/>
             <a:r>
-              <a:rPr lang="fr-FR" smtClean="0"/>
+              <a:rPr lang="fr-FR"/>
               <a:t>Cinquième niveau</a:t>
             </a:r>
-            <a:endParaRPr lang="fr-FR"/>
           </a:p>
         </p:txBody>
       </p:sp>
@@ -4438,7 +4023,7 @@
           <a:p>
             <a:fld id="{090BB305-B547-43E9-A3C0-FBFA669CED81}" type="datetimeFigureOut">
               <a:rPr lang="fr-FR" smtClean="0"/>
-              <a:t>06/12/2021</a:t>
+              <a:t>18/12/2021</a:t>
             </a:fld>
             <a:endParaRPr lang="fr-FR"/>
           </a:p>
@@ -4532,10 +4117,9 @@
           <a:lstStyle/>
           <a:p>
             <a:r>
-              <a:rPr lang="fr-FR" smtClean="0"/>
+              <a:rPr lang="fr-FR"/>
               <a:t>Modifiez le style du titre</a:t>
             </a:r>
-            <a:endParaRPr lang="fr-FR"/>
           </a:p>
         </p:txBody>
       </p:sp>
@@ -4556,7 +4140,7 @@
           <a:p>
             <a:fld id="{090BB305-B547-43E9-A3C0-FBFA669CED81}" type="datetimeFigureOut">
               <a:rPr lang="fr-FR" smtClean="0"/>
-              <a:t>06/12/2021</a:t>
+              <a:t>18/12/2021</a:t>
             </a:fld>
             <a:endParaRPr lang="fr-FR"/>
           </a:p>
@@ -4651,7 +4235,7 @@
           <a:p>
             <a:fld id="{090BB305-B547-43E9-A3C0-FBFA669CED81}" type="datetimeFigureOut">
               <a:rPr lang="fr-FR" smtClean="0"/>
-              <a:t>06/12/2021</a:t>
+              <a:t>18/12/2021</a:t>
             </a:fld>
             <a:endParaRPr lang="fr-FR"/>
           </a:p>
@@ -4754,10 +4338,9 @@
           </a:lstStyle>
           <a:p>
             <a:r>
-              <a:rPr lang="fr-FR" smtClean="0"/>
+              <a:rPr lang="fr-FR"/>
               <a:t>Modifiez le style du titre</a:t>
             </a:r>
-            <a:endParaRPr lang="fr-FR"/>
           </a:p>
         </p:txBody>
       </p:sp>
@@ -4811,38 +4394,37 @@
           <a:p>
             <a:pPr lvl="0"/>
             <a:r>
-              <a:rPr lang="fr-FR" smtClean="0"/>
+              <a:rPr lang="fr-FR"/>
               <a:t>Modifier les styles du texte du masque</a:t>
             </a:r>
           </a:p>
           <a:p>
             <a:pPr lvl="1"/>
             <a:r>
-              <a:rPr lang="fr-FR" smtClean="0"/>
+              <a:rPr lang="fr-FR"/>
               <a:t>Deuxième niveau</a:t>
             </a:r>
           </a:p>
           <a:p>
             <a:pPr lvl="2"/>
             <a:r>
-              <a:rPr lang="fr-FR" smtClean="0"/>
+              <a:rPr lang="fr-FR"/>
               <a:t>Troisième niveau</a:t>
             </a:r>
           </a:p>
           <a:p>
             <a:pPr lvl="3"/>
             <a:r>
-              <a:rPr lang="fr-FR" smtClean="0"/>
+              <a:rPr lang="fr-FR"/>
               <a:t>Quatrième niveau</a:t>
             </a:r>
           </a:p>
           <a:p>
             <a:pPr lvl="4"/>
             <a:r>
-              <a:rPr lang="fr-FR" smtClean="0"/>
+              <a:rPr lang="fr-FR"/>
               <a:t>Cinquième niveau</a:t>
             </a:r>
-            <a:endParaRPr lang="fr-FR"/>
           </a:p>
         </p:txBody>
       </p:sp>
@@ -4905,7 +4487,7 @@
           <a:p>
             <a:pPr lvl="0"/>
             <a:r>
-              <a:rPr lang="fr-FR" smtClean="0"/>
+              <a:rPr lang="fr-FR"/>
               <a:t>Modifier les styles du texte du masque</a:t>
             </a:r>
           </a:p>
@@ -4928,7 +4510,7 @@
           <a:p>
             <a:fld id="{090BB305-B547-43E9-A3C0-FBFA669CED81}" type="datetimeFigureOut">
               <a:rPr lang="fr-FR" smtClean="0"/>
-              <a:t>06/12/2021</a:t>
+              <a:t>18/12/2021</a:t>
             </a:fld>
             <a:endParaRPr lang="fr-FR"/>
           </a:p>
@@ -5031,10 +4613,9 @@
           </a:lstStyle>
           <a:p>
             <a:r>
-              <a:rPr lang="fr-FR" smtClean="0"/>
+              <a:rPr lang="fr-FR"/>
               <a:t>Modifiez le style du titre</a:t>
             </a:r>
-            <a:endParaRPr lang="fr-FR"/>
           </a:p>
         </p:txBody>
       </p:sp>
@@ -5158,7 +4739,7 @@
           <a:p>
             <a:pPr lvl="0"/>
             <a:r>
-              <a:rPr lang="fr-FR" smtClean="0"/>
+              <a:rPr lang="fr-FR"/>
               <a:t>Modifier les styles du texte du masque</a:t>
             </a:r>
           </a:p>
@@ -5181,7 +4762,7 @@
           <a:p>
             <a:fld id="{090BB305-B547-43E9-A3C0-FBFA669CED81}" type="datetimeFigureOut">
               <a:rPr lang="fr-FR" smtClean="0"/>
-              <a:t>06/12/2021</a:t>
+              <a:t>18/12/2021</a:t>
             </a:fld>
             <a:endParaRPr lang="fr-FR"/>
           </a:p>
@@ -5290,10 +4871,9 @@
           <a:lstStyle/>
           <a:p>
             <a:r>
-              <a:rPr lang="fr-FR" smtClean="0"/>
+              <a:rPr lang="fr-FR"/>
               <a:t>Modifiez le style du titre</a:t>
             </a:r>
-            <a:endParaRPr lang="fr-FR"/>
           </a:p>
         </p:txBody>
       </p:sp>
@@ -5324,38 +4904,37 @@
           <a:p>
             <a:pPr lvl="0"/>
             <a:r>
-              <a:rPr lang="fr-FR" smtClean="0"/>
+              <a:rPr lang="fr-FR"/>
               <a:t>Modifier les styles du texte du masque</a:t>
             </a:r>
           </a:p>
           <a:p>
             <a:pPr lvl="1"/>
             <a:r>
-              <a:rPr lang="fr-FR" smtClean="0"/>
+              <a:rPr lang="fr-FR"/>
               <a:t>Deuxième niveau</a:t>
             </a:r>
           </a:p>
           <a:p>
             <a:pPr lvl="2"/>
             <a:r>
-              <a:rPr lang="fr-FR" smtClean="0"/>
+              <a:rPr lang="fr-FR"/>
               <a:t>Troisième niveau</a:t>
             </a:r>
           </a:p>
           <a:p>
             <a:pPr lvl="3"/>
             <a:r>
-              <a:rPr lang="fr-FR" smtClean="0"/>
+              <a:rPr lang="fr-FR"/>
               <a:t>Quatrième niveau</a:t>
             </a:r>
           </a:p>
           <a:p>
             <a:pPr lvl="4"/>
             <a:r>
-              <a:rPr lang="fr-FR" smtClean="0"/>
+              <a:rPr lang="fr-FR"/>
               <a:t>Cinquième niveau</a:t>
             </a:r>
-            <a:endParaRPr lang="fr-FR"/>
           </a:p>
         </p:txBody>
       </p:sp>
@@ -5394,7 +4973,7 @@
           <a:p>
             <a:fld id="{090BB305-B547-43E9-A3C0-FBFA669CED81}" type="datetimeFigureOut">
               <a:rPr lang="fr-FR" smtClean="0"/>
-              <a:t>06/12/2021</a:t>
+              <a:t>18/12/2021</a:t>
             </a:fld>
             <a:endParaRPr lang="fr-FR"/>
           </a:p>
@@ -5815,10 +5394,9 @@
           <a:lstStyle/>
           <a:p>
             <a:r>
-              <a:rPr lang="fr-FR" dirty="0" smtClean="0"/>
+              <a:rPr lang="fr-FR" dirty="0"/>
               <a:t>Architecture logicielle</a:t>
             </a:r>
-            <a:endParaRPr lang="fr-FR" dirty="0"/>
           </a:p>
         </p:txBody>
       </p:sp>
@@ -5838,10 +5416,9 @@
           <a:lstStyle/>
           <a:p>
             <a:r>
-              <a:rPr lang="fr-FR" dirty="0" smtClean="0"/>
+              <a:rPr lang="fr-FR" dirty="0"/>
               <a:t>Exploration des méthodes de classement en canoë-kayak slalom</a:t>
             </a:r>
-            <a:endParaRPr lang="fr-FR" dirty="0"/>
           </a:p>
         </p:txBody>
       </p:sp>
@@ -5897,10 +5474,9 @@
           <a:p>
             <a:pPr algn="ctr"/>
             <a:r>
-              <a:rPr lang="fr-FR" dirty="0" smtClean="0"/>
+              <a:rPr lang="fr-FR" dirty="0"/>
               <a:t>Architecture globale</a:t>
             </a:r>
-            <a:endParaRPr lang="fr-FR" dirty="0"/>
           </a:p>
         </p:txBody>
       </p:sp>
@@ -5944,26 +5520,18 @@
           <a:p>
             <a:pPr algn="ctr"/>
             <a:r>
-              <a:rPr lang="fr-FR" sz="2400" b="1" u="sng" dirty="0" smtClean="0"/>
+              <a:rPr lang="fr-FR" sz="2400" b="1" u="sng" dirty="0"/>
               <a:t>Scraper :</a:t>
             </a:r>
           </a:p>
           <a:p>
             <a:pPr algn="ctr"/>
             <a:r>
-              <a:rPr lang="fr-FR" dirty="0" smtClean="0"/>
-              <a:t>Récupère les données de la FFCK et les stocke </a:t>
-            </a:r>
-            <a:r>
               <a:rPr lang="fr-FR" dirty="0"/>
-              <a:t>s</a:t>
-            </a:r>
-            <a:r>
-              <a:rPr lang="fr-FR" dirty="0" smtClean="0"/>
-              <a:t>ous format CSV avec </a:t>
-            </a:r>
-            <a:r>
-              <a:rPr lang="fr-FR" dirty="0" err="1" smtClean="0"/>
+              <a:t>Récupère les données de la FFCK et les stocke sous format CSV avec </a:t>
+            </a:r>
+            <a:r>
+              <a:rPr lang="fr-FR" dirty="0" err="1"/>
               <a:t>CsvDataService</a:t>
             </a:r>
             <a:endParaRPr lang="fr-FR" dirty="0"/>
@@ -6010,25 +5578,24 @@
           <a:p>
             <a:pPr algn="ctr"/>
             <a:r>
-              <a:rPr lang="fr-FR" sz="2400" b="1" u="sng" dirty="0" err="1" smtClean="0"/>
+              <a:rPr lang="fr-FR" sz="2400" b="1" u="sng" dirty="0" err="1"/>
               <a:t>DatebaseService</a:t>
             </a:r>
             <a:r>
-              <a:rPr lang="fr-FR" sz="2400" b="1" u="sng" dirty="0" smtClean="0"/>
+              <a:rPr lang="fr-FR" sz="2400" b="1" u="sng" dirty="0"/>
               <a:t> </a:t>
             </a:r>
             <a:r>
-              <a:rPr lang="fr-FR" sz="2400" u="sng" dirty="0" smtClean="0"/>
+              <a:rPr lang="fr-FR" sz="2400" u="sng" dirty="0"/>
               <a:t>:</a:t>
             </a:r>
           </a:p>
           <a:p>
             <a:pPr algn="ctr"/>
             <a:r>
-              <a:rPr lang="fr-FR" dirty="0" smtClean="0"/>
+              <a:rPr lang="fr-FR" dirty="0"/>
               <a:t>Opère le CRUD des données de la BDD</a:t>
             </a:r>
-            <a:endParaRPr lang="fr-FR" dirty="0"/>
           </a:p>
         </p:txBody>
       </p:sp>
@@ -6072,17 +5639,16 @@
           <a:p>
             <a:pPr algn="ctr"/>
             <a:r>
-              <a:rPr lang="fr-FR" sz="2400" b="1" u="sng" dirty="0" smtClean="0"/>
+              <a:rPr lang="fr-FR" sz="2400" b="1" u="sng" dirty="0"/>
               <a:t>Points Computer :</a:t>
             </a:r>
           </a:p>
           <a:p>
             <a:pPr algn="ctr"/>
             <a:r>
-              <a:rPr lang="fr-FR" dirty="0" smtClean="0"/>
+              <a:rPr lang="fr-FR" dirty="0"/>
               <a:t>Calcule les points et les valeurs des athlètes à partir des données de la BDD et des méthodes fournies</a:t>
             </a:r>
-            <a:endParaRPr lang="fr-FR" dirty="0"/>
           </a:p>
         </p:txBody>
       </p:sp>
@@ -6126,21 +5692,20 @@
           <a:p>
             <a:pPr algn="ctr"/>
             <a:r>
-              <a:rPr lang="fr-FR" sz="2400" b="1" u="sng" dirty="0" err="1" smtClean="0"/>
+              <a:rPr lang="fr-FR" sz="2400" b="1" u="sng" dirty="0" err="1"/>
               <a:t>Analyst</a:t>
             </a:r>
             <a:r>
-              <a:rPr lang="fr-FR" sz="2400" b="1" u="sng" dirty="0" smtClean="0"/>
+              <a:rPr lang="fr-FR" sz="2400" b="1" u="sng" dirty="0"/>
               <a:t> :</a:t>
             </a:r>
           </a:p>
           <a:p>
             <a:pPr algn="ctr"/>
             <a:r>
-              <a:rPr lang="fr-FR" dirty="0" smtClean="0"/>
+              <a:rPr lang="fr-FR" dirty="0"/>
               <a:t>Effectue des opérations sur les données de la BDD pour obtenir des métriques ou préparer les données pour la visualisation</a:t>
             </a:r>
-            <a:endParaRPr lang="fr-FR" dirty="0"/>
           </a:p>
         </p:txBody>
       </p:sp>
@@ -6184,14 +5749,14 @@
           <a:p>
             <a:pPr algn="ctr"/>
             <a:r>
-              <a:rPr lang="fr-FR" sz="2400" b="1" u="sng" dirty="0" smtClean="0"/>
+              <a:rPr lang="fr-FR" sz="2400" b="1" u="sng" dirty="0"/>
               <a:t>Cockpit :</a:t>
             </a:r>
           </a:p>
           <a:p>
             <a:pPr algn="ctr"/>
             <a:r>
-              <a:rPr lang="fr-FR" dirty="0" smtClean="0"/>
+              <a:rPr lang="fr-FR" dirty="0"/>
               <a:t>Permet la visualisation des données</a:t>
             </a:r>
           </a:p>
@@ -6241,21 +5806,20 @@
           <a:p>
             <a:pPr algn="ctr"/>
             <a:r>
-              <a:rPr lang="fr-FR" sz="2400" b="1" u="sng" dirty="0" err="1" smtClean="0"/>
+              <a:rPr lang="fr-FR" sz="2400" b="1" u="sng" dirty="0" err="1"/>
               <a:t>ValueAccessor</a:t>
             </a:r>
             <a:r>
-              <a:rPr lang="fr-FR" sz="2400" b="1" u="sng" dirty="0" smtClean="0"/>
+              <a:rPr lang="fr-FR" sz="2400" b="1" u="sng" dirty="0"/>
               <a:t> :</a:t>
             </a:r>
           </a:p>
           <a:p>
             <a:pPr algn="ctr"/>
             <a:r>
-              <a:rPr lang="fr-FR" dirty="0" smtClean="0"/>
+              <a:rPr lang="fr-FR" dirty="0"/>
               <a:t>Récupère la valeur de l’athlète souhaité à la date voulue si celle-ci existe ou la calcule dans le cas contraire</a:t>
             </a:r>
-            <a:endParaRPr lang="fr-FR" dirty="0"/>
           </a:p>
         </p:txBody>
       </p:sp>
@@ -6299,19 +5863,19 @@
           <a:p>
             <a:pPr algn="ctr"/>
             <a:r>
-              <a:rPr lang="fr-FR" sz="2400" b="1" u="sng" dirty="0" err="1" smtClean="0"/>
+              <a:rPr lang="fr-FR" sz="2400" b="1" u="sng" dirty="0" err="1"/>
               <a:t>Datebase</a:t>
             </a:r>
             <a:r>
-              <a:rPr lang="fr-FR" sz="2400" b="1" u="sng" dirty="0" smtClean="0"/>
+              <a:rPr lang="fr-FR" sz="2400" b="1" u="sng" dirty="0"/>
               <a:t> (</a:t>
             </a:r>
             <a:r>
-              <a:rPr lang="fr-FR" sz="2400" b="1" u="sng" dirty="0" err="1" smtClean="0"/>
+              <a:rPr lang="fr-FR" sz="2400" b="1" u="sng" dirty="0" err="1"/>
               <a:t>MongoDB</a:t>
             </a:r>
             <a:r>
-              <a:rPr lang="fr-FR" sz="2400" b="1" u="sng" dirty="0" smtClean="0"/>
+              <a:rPr lang="fr-FR" sz="2400" b="1" u="sng" dirty="0"/>
               <a:t>)</a:t>
             </a:r>
             <a:endParaRPr lang="fr-FR" dirty="0"/>
@@ -6467,24 +6031,19 @@
             <a:pPr algn="ctr"/>
             <a:r>
               <a:rPr lang="fr-FR" sz="2400" b="1" u="sng" dirty="0" err="1"/>
-              <a:t>C</a:t>
-            </a:r>
-            <a:r>
-              <a:rPr lang="fr-FR" sz="2400" b="1" u="sng" dirty="0" err="1" smtClean="0"/>
-              <a:t>ompetitionProcessor</a:t>
-            </a:r>
-            <a:r>
-              <a:rPr lang="fr-FR" sz="2400" b="1" u="sng" dirty="0" smtClean="0"/>
+              <a:t>CompetitionProcessor</a:t>
+            </a:r>
+            <a:r>
+              <a:rPr lang="fr-FR" sz="2400" b="1" u="sng" dirty="0"/>
               <a:t> :</a:t>
             </a:r>
           </a:p>
           <a:p>
             <a:pPr algn="ctr"/>
             <a:r>
-              <a:rPr lang="fr-FR" dirty="0" smtClean="0"/>
+              <a:rPr lang="fr-FR" dirty="0"/>
               <a:t>Détermine l’ordre de calcul des points</a:t>
             </a:r>
-            <a:endParaRPr lang="fr-FR" dirty="0"/>
           </a:p>
         </p:txBody>
       </p:sp>
@@ -6816,25 +6375,20 @@
           <a:p>
             <a:pPr algn="ctr"/>
             <a:r>
-              <a:rPr lang="fr-FR" sz="2400" b="1" u="sng" dirty="0" err="1" smtClean="0"/>
+              <a:rPr lang="fr-FR" sz="2400" b="1" u="sng" dirty="0" err="1"/>
               <a:t>CsvDataService</a:t>
             </a:r>
             <a:r>
-              <a:rPr lang="fr-FR" sz="2400" b="1" u="sng" dirty="0" smtClean="0"/>
-              <a:t> </a:t>
-            </a:r>
-            <a:r>
-              <a:rPr lang="fr-FR" sz="2400" b="1" u="sng" dirty="0" smtClean="0"/>
-              <a:t>:</a:t>
+              <a:rPr lang="fr-FR" sz="2400" b="1" u="sng" dirty="0"/>
+              <a:t> :</a:t>
             </a:r>
           </a:p>
           <a:p>
             <a:pPr algn="ctr"/>
             <a:r>
-              <a:rPr lang="fr-FR" dirty="0" smtClean="0"/>
+              <a:rPr lang="fr-FR" dirty="0"/>
               <a:t>Permet d’enregistrer et de lire les fichiers de courses sous format csv</a:t>
             </a:r>
-            <a:endParaRPr lang="fr-FR" dirty="0"/>
           </a:p>
         </p:txBody>
       </p:sp>
@@ -6884,13 +6438,6 @@
   <p:clrMapOvr>
     <a:masterClrMapping/>
   </p:clrMapOvr>
-  <p:timing>
-    <p:tnLst>
-      <p:par>
-        <p:cTn id="1" dur="indefinite" restart="never" nodeType="tmRoot"/>
-      </p:par>
-    </p:tnLst>
-  </p:timing>
 </p:sld>
 </file>
 
@@ -6928,10 +6475,9 @@
           <a:p>
             <a:pPr algn="ctr"/>
             <a:r>
-              <a:rPr lang="fr-FR" dirty="0" smtClean="0"/>
+              <a:rPr lang="fr-FR" dirty="0"/>
               <a:t>Schéma de la base de données simplifiée</a:t>
             </a:r>
-            <a:endParaRPr lang="fr-FR" dirty="0"/>
           </a:p>
         </p:txBody>
       </p:sp>
@@ -6970,130 +6516,130 @@
           <a:p>
             <a:pPr algn="ctr"/>
             <a:r>
-              <a:rPr lang="fr-FR" b="1" dirty="0" smtClean="0"/>
+              <a:rPr lang="fr-FR" b="1" dirty="0"/>
               <a:t>Participation</a:t>
             </a:r>
           </a:p>
           <a:p>
             <a:pPr algn="ctr"/>
             <a:r>
-              <a:rPr lang="fr-FR" i="1" u="sng" dirty="0" err="1" smtClean="0"/>
+              <a:rPr lang="fr-FR" i="1" u="sng" dirty="0" err="1"/>
               <a:t>CompetitorName</a:t>
             </a:r>
-            <a:endParaRPr lang="fr-FR" i="1" u="sng" dirty="0" smtClean="0"/>
+            <a:endParaRPr lang="fr-FR" i="1" u="sng" dirty="0"/>
           </a:p>
           <a:p>
             <a:pPr algn="ctr"/>
             <a:r>
-              <a:rPr lang="fr-FR" i="1" u="sng" dirty="0" err="1" smtClean="0"/>
+              <a:rPr lang="fr-FR" i="1" u="sng" dirty="0" err="1"/>
               <a:t>CompetitorCategory</a:t>
             </a:r>
-            <a:endParaRPr lang="fr-FR" i="1" u="sng" dirty="0" smtClean="0"/>
+            <a:endParaRPr lang="fr-FR" i="1" u="sng" dirty="0"/>
           </a:p>
           <a:p>
             <a:pPr algn="ctr"/>
             <a:r>
-              <a:rPr lang="fr-FR" i="1" u="sng" dirty="0" err="1" smtClean="0"/>
+              <a:rPr lang="fr-FR" i="1" u="sng" dirty="0" err="1"/>
               <a:t>CompetitionName</a:t>
             </a:r>
-            <a:endParaRPr lang="fr-FR" i="1" u="sng" dirty="0" smtClean="0"/>
+            <a:endParaRPr lang="fr-FR" i="1" u="sng" dirty="0"/>
           </a:p>
           <a:p>
             <a:pPr algn="ctr"/>
             <a:r>
-              <a:rPr lang="fr-FR" i="1" dirty="0" err="1" smtClean="0"/>
+              <a:rPr lang="fr-FR" i="1" dirty="0" err="1"/>
               <a:t>SimplifiedCompetitionName</a:t>
             </a:r>
-            <a:endParaRPr lang="fr-FR" i="1" dirty="0" smtClean="0"/>
+            <a:endParaRPr lang="fr-FR" i="1" dirty="0"/>
           </a:p>
           <a:p>
             <a:pPr algn="ctr"/>
             <a:r>
-              <a:rPr lang="fr-FR" i="1" dirty="0" err="1" smtClean="0"/>
+              <a:rPr lang="fr-FR" i="1" dirty="0" err="1"/>
               <a:t>CompetitionPhase</a:t>
             </a:r>
-            <a:endParaRPr lang="fr-FR" i="1" dirty="0" smtClean="0"/>
+            <a:endParaRPr lang="fr-FR" i="1" dirty="0"/>
           </a:p>
           <a:p>
             <a:pPr algn="ctr"/>
             <a:r>
-              <a:rPr lang="fr-FR" i="1" dirty="0" err="1" smtClean="0"/>
+              <a:rPr lang="fr-FR" i="1" dirty="0" err="1"/>
               <a:t>SimplifiedCompetitionPhase</a:t>
             </a:r>
-            <a:endParaRPr lang="fr-FR" i="1" dirty="0" smtClean="0"/>
+            <a:endParaRPr lang="fr-FR" i="1" dirty="0"/>
           </a:p>
           <a:p>
             <a:pPr algn="ctr"/>
             <a:r>
-              <a:rPr lang="fr-FR" i="1" dirty="0" smtClean="0"/>
+              <a:rPr lang="fr-FR" i="1" dirty="0"/>
               <a:t>Date</a:t>
             </a:r>
           </a:p>
           <a:p>
             <a:pPr algn="ctr"/>
             <a:r>
-              <a:rPr lang="fr-FR" i="1" dirty="0" err="1" smtClean="0"/>
+              <a:rPr lang="fr-FR" i="1" dirty="0" err="1"/>
               <a:t>Level</a:t>
             </a:r>
-            <a:endParaRPr lang="fr-FR" i="1" dirty="0" smtClean="0"/>
+            <a:endParaRPr lang="fr-FR" i="1" dirty="0"/>
           </a:p>
           <a:p>
             <a:pPr algn="ctr"/>
             <a:r>
-              <a:rPr lang="fr-FR" i="1" dirty="0" err="1" smtClean="0"/>
+              <a:rPr lang="fr-FR" i="1" dirty="0" err="1"/>
               <a:t>FinalType</a:t>
             </a:r>
-            <a:endParaRPr lang="fr-FR" i="1" dirty="0" smtClean="0"/>
+            <a:endParaRPr lang="fr-FR" i="1" dirty="0"/>
           </a:p>
           <a:p>
             <a:pPr algn="ctr"/>
             <a:r>
-              <a:rPr lang="fr-FR" i="1" dirty="0" smtClean="0"/>
+              <a:rPr lang="fr-FR" i="1" dirty="0"/>
               <a:t>Score</a:t>
             </a:r>
           </a:p>
           <a:p>
             <a:pPr algn="ctr"/>
             <a:r>
-              <a:rPr lang="fr-FR" i="1" dirty="0" err="1" smtClean="0"/>
+              <a:rPr lang="fr-FR" i="1" dirty="0" err="1"/>
               <a:t>PointTypes</a:t>
             </a:r>
             <a:r>
-              <a:rPr lang="fr-FR" i="1" dirty="0" smtClean="0"/>
+              <a:rPr lang="fr-FR" i="1" dirty="0"/>
               <a:t> (</a:t>
             </a:r>
             <a:r>
-              <a:rPr lang="fr-FR" i="1" dirty="0" err="1" smtClean="0"/>
+              <a:rPr lang="fr-FR" i="1" dirty="0" err="1"/>
               <a:t>list</a:t>
             </a:r>
             <a:r>
-              <a:rPr lang="fr-FR" i="1" dirty="0" smtClean="0"/>
+              <a:rPr lang="fr-FR" i="1" dirty="0"/>
               <a:t>)</a:t>
             </a:r>
           </a:p>
           <a:p>
             <a:pPr algn="ctr"/>
             <a:r>
-              <a:rPr lang="fr-FR" i="1" dirty="0" smtClean="0"/>
+              <a:rPr lang="fr-FR" i="1" dirty="0"/>
               <a:t>Points : {</a:t>
             </a:r>
             <a:r>
-              <a:rPr lang="fr-FR" i="1" dirty="0" err="1" smtClean="0"/>
+              <a:rPr lang="fr-FR" i="1" dirty="0" err="1"/>
               <a:t>Scrapping</a:t>
             </a:r>
             <a:r>
-              <a:rPr lang="fr-FR" i="1" dirty="0" smtClean="0"/>
+              <a:rPr lang="fr-FR" i="1" dirty="0"/>
               <a:t> : …</a:t>
             </a:r>
           </a:p>
           <a:p>
             <a:pPr algn="ctr"/>
             <a:r>
-              <a:rPr lang="fr-FR" i="1" dirty="0" smtClean="0"/>
+              <a:rPr lang="fr-FR" i="1" dirty="0"/>
               <a:t>         </a:t>
             </a:r>
             <a:r>
-              <a:rPr lang="fr-FR" i="1" dirty="0" smtClean="0">
+              <a:rPr lang="fr-FR" i="1" dirty="0">
                 <a:solidFill>
                   <a:schemeClr val="accent6"/>
                 </a:solidFill>
@@ -7104,64 +6650,64 @@
           <a:p>
             <a:pPr algn="ctr"/>
             <a:r>
-              <a:rPr lang="fr-FR" i="1" dirty="0" smtClean="0"/>
+              <a:rPr lang="fr-FR" i="1" dirty="0"/>
               <a:t>…}</a:t>
             </a:r>
           </a:p>
           <a:p>
             <a:pPr algn="ctr"/>
             <a:r>
-              <a:rPr lang="fr-FR" i="1" dirty="0" err="1" smtClean="0"/>
+              <a:rPr lang="fr-FR" i="1" dirty="0" err="1"/>
               <a:t>ValueTypes</a:t>
             </a:r>
             <a:r>
-              <a:rPr lang="fr-FR" i="1" dirty="0" smtClean="0"/>
+              <a:rPr lang="fr-FR" i="1" dirty="0"/>
               <a:t> (</a:t>
             </a:r>
             <a:r>
-              <a:rPr lang="fr-FR" i="1" dirty="0" err="1" smtClean="0"/>
+              <a:rPr lang="fr-FR" i="1" dirty="0" err="1"/>
               <a:t>list</a:t>
             </a:r>
             <a:r>
-              <a:rPr lang="fr-FR" i="1" dirty="0" smtClean="0"/>
+              <a:rPr lang="fr-FR" i="1" dirty="0"/>
               <a:t>)</a:t>
             </a:r>
           </a:p>
           <a:p>
             <a:pPr algn="ctr"/>
             <a:r>
-              <a:rPr lang="fr-FR" i="1" dirty="0" smtClean="0"/>
+              <a:rPr lang="fr-FR" i="1" dirty="0"/>
               <a:t>Values : {</a:t>
             </a:r>
             <a:r>
-              <a:rPr lang="fr-FR" i="1" dirty="0" err="1" smtClean="0"/>
+              <a:rPr lang="fr-FR" i="1" dirty="0" err="1"/>
               <a:t>Scrapping</a:t>
             </a:r>
             <a:r>
-              <a:rPr lang="fr-FR" i="1" dirty="0" smtClean="0"/>
+              <a:rPr lang="fr-FR" i="1" dirty="0"/>
               <a:t> :{points:…, </a:t>
             </a:r>
             <a:r>
-              <a:rPr lang="fr-FR" i="1" dirty="0" err="1" smtClean="0"/>
+              <a:rPr lang="fr-FR" i="1" dirty="0" err="1"/>
               <a:t>nbCompetitions</a:t>
             </a:r>
             <a:r>
-              <a:rPr lang="fr-FR" i="1" dirty="0" smtClean="0"/>
+              <a:rPr lang="fr-FR" i="1" dirty="0"/>
               <a:t> : -1, </a:t>
             </a:r>
             <a:r>
-              <a:rPr lang="fr-FR" i="1" dirty="0" err="1" smtClean="0"/>
+              <a:rPr lang="fr-FR" i="1" dirty="0" err="1"/>
               <a:t>nbNationals</a:t>
             </a:r>
             <a:r>
-              <a:rPr lang="fr-FR" i="1" dirty="0" smtClean="0"/>
+              <a:rPr lang="fr-FR" i="1" dirty="0"/>
               <a:t> : -1}</a:t>
             </a:r>
           </a:p>
           <a:p>
             <a:pPr algn="ctr"/>
             <a:r>
-              <a:rPr lang="fr-FR" i="1" dirty="0" smtClean="0">
+              <a:rPr lang="fr-FR" i="1" dirty="0">
                 <a:solidFill>
                   <a:schemeClr val="accent6"/>
                 </a:solidFill>
@@ -7169,258 +6715,13 @@
               <a:t>Type1 : {…}</a:t>
             </a:r>
             <a:r>
-              <a:rPr lang="fr-FR" i="1" dirty="0" smtClean="0">
+              <a:rPr lang="fr-FR" i="1" dirty="0">
                 <a:solidFill>
                   <a:schemeClr val="tx1"/>
                 </a:solidFill>
               </a:rPr>
               <a:t>}</a:t>
             </a:r>
-          </a:p>
-        </p:txBody>
-      </p:sp>
-      <p:sp>
-        <p:nvSpPr>
-          <p:cNvPr id="8" name="Rectangle 7"/>
-          <p:cNvSpPr/>
-          <p:nvPr/>
-        </p:nvSpPr>
-        <p:spPr>
-          <a:xfrm>
-            <a:off x="3915003" y="3634349"/>
-            <a:ext cx="2452252" cy="3027707"/>
-          </a:xfrm>
-          <a:prstGeom prst="rect">
-            <a:avLst/>
-          </a:prstGeom>
-        </p:spPr>
-        <p:style>
-          <a:lnRef idx="2">
-            <a:schemeClr val="accent1"/>
-          </a:lnRef>
-          <a:fillRef idx="1">
-            <a:schemeClr val="lt1"/>
-          </a:fillRef>
-          <a:effectRef idx="0">
-            <a:schemeClr val="accent1"/>
-          </a:effectRef>
-          <a:fontRef idx="minor">
-            <a:schemeClr val="dk1"/>
-          </a:fontRef>
-        </p:style>
-        <p:txBody>
-          <a:bodyPr rtlCol="0" anchor="ctr"/>
-          <a:lstStyle/>
-          <a:p>
-            <a:pPr algn="ctr"/>
-            <a:r>
-              <a:rPr lang="fr-FR" b="1" dirty="0" smtClean="0">
-                <a:solidFill>
-                  <a:schemeClr val="accent6"/>
-                </a:solidFill>
-              </a:rPr>
-              <a:t>Value</a:t>
-            </a:r>
-          </a:p>
-          <a:p>
-            <a:pPr algn="ctr"/>
-            <a:r>
-              <a:rPr lang="fr-FR" i="1" u="sng" dirty="0" err="1" smtClean="0">
-                <a:solidFill>
-                  <a:schemeClr val="accent6"/>
-                </a:solidFill>
-              </a:rPr>
-              <a:t>Competitor</a:t>
-            </a:r>
-            <a:r>
-              <a:rPr lang="fr-FR" i="1" u="sng" dirty="0" err="1">
-                <a:solidFill>
-                  <a:schemeClr val="accent6"/>
-                </a:solidFill>
-              </a:rPr>
-              <a:t>N</a:t>
-            </a:r>
-            <a:r>
-              <a:rPr lang="fr-FR" i="1" u="sng" dirty="0" err="1" smtClean="0">
-                <a:solidFill>
-                  <a:schemeClr val="accent6"/>
-                </a:solidFill>
-              </a:rPr>
-              <a:t>ame</a:t>
-            </a:r>
-            <a:endParaRPr lang="fr-FR" i="1" u="sng" dirty="0" smtClean="0">
-              <a:solidFill>
-                <a:schemeClr val="accent6"/>
-              </a:solidFill>
-            </a:endParaRPr>
-          </a:p>
-          <a:p>
-            <a:pPr algn="ctr"/>
-            <a:r>
-              <a:rPr lang="fr-FR" i="1" u="sng" dirty="0" err="1" smtClean="0">
-                <a:solidFill>
-                  <a:schemeClr val="accent6"/>
-                </a:solidFill>
-              </a:rPr>
-              <a:t>Competitor</a:t>
-            </a:r>
-            <a:r>
-              <a:rPr lang="fr-FR" i="1" u="sng" dirty="0" err="1">
-                <a:solidFill>
-                  <a:schemeClr val="accent6"/>
-                </a:solidFill>
-              </a:rPr>
-              <a:t>C</a:t>
-            </a:r>
-            <a:r>
-              <a:rPr lang="fr-FR" i="1" u="sng" dirty="0" err="1" smtClean="0">
-                <a:solidFill>
-                  <a:schemeClr val="accent6"/>
-                </a:solidFill>
-              </a:rPr>
-              <a:t>ategory</a:t>
-            </a:r>
-            <a:endParaRPr lang="fr-FR" i="1" u="sng" dirty="0" smtClean="0">
-              <a:solidFill>
-                <a:schemeClr val="accent6"/>
-              </a:solidFill>
-            </a:endParaRPr>
-          </a:p>
-          <a:p>
-            <a:pPr algn="ctr"/>
-            <a:r>
-              <a:rPr lang="fr-FR" i="1" u="sng" dirty="0" smtClean="0">
-                <a:solidFill>
-                  <a:schemeClr val="accent6"/>
-                </a:solidFill>
-              </a:rPr>
-              <a:t>Date</a:t>
-            </a:r>
-            <a:endParaRPr lang="fr-FR" i="1" dirty="0" smtClean="0">
-              <a:solidFill>
-                <a:schemeClr val="accent6"/>
-              </a:solidFill>
-            </a:endParaRPr>
-          </a:p>
-          <a:p>
-            <a:pPr algn="ctr"/>
-            <a:r>
-              <a:rPr lang="fr-FR" i="1" u="sng" dirty="0" err="1" smtClean="0">
-                <a:solidFill>
-                  <a:schemeClr val="accent6"/>
-                </a:solidFill>
-              </a:rPr>
-              <a:t>ValueType</a:t>
-            </a:r>
-            <a:endParaRPr lang="fr-FR" i="1" u="sng" dirty="0" smtClean="0">
-              <a:solidFill>
-                <a:schemeClr val="accent6"/>
-              </a:solidFill>
-            </a:endParaRPr>
-          </a:p>
-          <a:p>
-            <a:pPr algn="ctr"/>
-            <a:r>
-              <a:rPr lang="fr-FR" i="1" dirty="0" err="1" smtClean="0">
-                <a:solidFill>
-                  <a:schemeClr val="accent6"/>
-                </a:solidFill>
-              </a:rPr>
-              <a:t>PointType</a:t>
-            </a:r>
-            <a:endParaRPr lang="fr-FR" i="1" dirty="0" smtClean="0">
-              <a:solidFill>
-                <a:schemeClr val="accent6"/>
-              </a:solidFill>
-            </a:endParaRPr>
-          </a:p>
-          <a:p>
-            <a:pPr algn="ctr"/>
-            <a:r>
-              <a:rPr lang="fr-FR" i="1" dirty="0" err="1" smtClean="0">
-                <a:solidFill>
-                  <a:schemeClr val="accent6"/>
-                </a:solidFill>
-              </a:rPr>
-              <a:t>ValuePoints</a:t>
-            </a:r>
-            <a:r>
-              <a:rPr lang="fr-FR" i="1" dirty="0" smtClean="0">
-                <a:solidFill>
-                  <a:schemeClr val="accent6"/>
-                </a:solidFill>
-              </a:rPr>
-              <a:t> </a:t>
-            </a:r>
-            <a:r>
-              <a:rPr lang="fr-FR" i="1" dirty="0" err="1" smtClean="0">
-                <a:solidFill>
-                  <a:schemeClr val="accent6"/>
-                </a:solidFill>
-              </a:rPr>
-              <a:t>NbCompetitions</a:t>
-            </a:r>
-            <a:endParaRPr lang="fr-FR" i="1" dirty="0" smtClean="0">
-              <a:solidFill>
-                <a:schemeClr val="accent6"/>
-              </a:solidFill>
-            </a:endParaRPr>
-          </a:p>
-          <a:p>
-            <a:pPr algn="ctr"/>
-            <a:r>
-              <a:rPr lang="fr-FR" i="1" dirty="0" err="1" smtClean="0">
-                <a:solidFill>
-                  <a:schemeClr val="accent6"/>
-                </a:solidFill>
-              </a:rPr>
-              <a:t>NbNationals</a:t>
-            </a:r>
-            <a:endParaRPr lang="fr-FR" i="1" dirty="0">
-              <a:solidFill>
-                <a:schemeClr val="accent6"/>
-              </a:solidFill>
-            </a:endParaRPr>
-          </a:p>
-          <a:p>
-            <a:pPr algn="ctr"/>
-            <a:r>
-              <a:rPr lang="fr-FR" i="1" dirty="0" err="1" smtClean="0">
-                <a:solidFill>
-                  <a:schemeClr val="accent6"/>
-                </a:solidFill>
-              </a:rPr>
-              <a:t>Ranking</a:t>
-            </a:r>
-            <a:r>
-              <a:rPr lang="fr-FR" i="1" dirty="0" smtClean="0">
-                <a:solidFill>
-                  <a:schemeClr val="accent6"/>
-                </a:solidFill>
-              </a:rPr>
-              <a:t> (</a:t>
-            </a:r>
-            <a:r>
-              <a:rPr lang="fr-FR" i="1" dirty="0" err="1" smtClean="0">
-                <a:solidFill>
-                  <a:schemeClr val="accent6"/>
-                </a:solidFill>
-              </a:rPr>
-              <a:t>opt</a:t>
-            </a:r>
-            <a:r>
-              <a:rPr lang="fr-FR" i="1" dirty="0" smtClean="0">
-                <a:solidFill>
-                  <a:schemeClr val="accent6"/>
-                </a:solidFill>
-              </a:rPr>
-              <a:t>)</a:t>
-            </a:r>
-            <a:endParaRPr lang="fr-FR" i="1" dirty="0">
-              <a:solidFill>
-                <a:schemeClr val="accent6"/>
-              </a:solidFill>
-            </a:endParaRPr>
           </a:p>
         </p:txBody>
       </p:sp>
@@ -7464,7 +6765,7 @@
           <a:p>
             <a:pPr algn="ctr"/>
             <a:r>
-              <a:rPr lang="fr-FR" b="1" dirty="0" smtClean="0">
+              <a:rPr lang="fr-FR" b="1" dirty="0">
                 <a:solidFill>
                   <a:prstClr val="black"/>
                 </a:solidFill>
@@ -7475,7 +6776,7 @@
           <a:p>
             <a:pPr algn="ctr"/>
             <a:r>
-              <a:rPr lang="fr-FR" i="1" u="sng" dirty="0" smtClean="0">
+              <a:rPr lang="fr-FR" i="1" u="sng" dirty="0">
                 <a:solidFill>
                   <a:prstClr val="black"/>
                 </a:solidFill>
@@ -7486,7 +6787,7 @@
           <a:p>
             <a:pPr algn="ctr"/>
             <a:r>
-              <a:rPr lang="fr-FR" i="1" dirty="0" smtClean="0">
+              <a:rPr lang="fr-FR" i="1" dirty="0">
                 <a:solidFill>
                   <a:prstClr val="black"/>
                 </a:solidFill>
@@ -7494,14 +6795,14 @@
               <a:t>Champ issu du </a:t>
             </a:r>
             <a:r>
-              <a:rPr lang="fr-FR" i="1" dirty="0" err="1" smtClean="0">
+              <a:rPr lang="fr-FR" i="1" dirty="0" err="1">
                 <a:solidFill>
                   <a:prstClr val="black"/>
                 </a:solidFill>
               </a:rPr>
               <a:t>scrapping</a:t>
             </a:r>
-            <a:endParaRPr lang="fr-FR" i="1" dirty="0" smtClean="0">
+            <a:endParaRPr lang="fr-FR" i="1" dirty="0">
               <a:solidFill>
                 <a:prstClr val="black"/>
               </a:solidFill>
@@ -7510,7 +6811,7 @@
           <a:p>
             <a:pPr algn="ctr"/>
             <a:r>
-              <a:rPr lang="fr-FR" i="1" dirty="0" smtClean="0">
+              <a:rPr lang="fr-FR" i="1" dirty="0">
                 <a:solidFill>
                   <a:schemeClr val="accent6"/>
                 </a:solidFill>
@@ -7555,14 +6856,14 @@
           <a:p>
             <a:pPr algn="ctr"/>
             <a:r>
-              <a:rPr lang="fr-FR" b="1" dirty="0" err="1" smtClean="0">
+              <a:rPr lang="fr-FR" b="1" dirty="0" err="1">
                 <a:solidFill>
                   <a:schemeClr val="accent6"/>
                 </a:solidFill>
               </a:rPr>
               <a:t>PointComputingDetails</a:t>
             </a:r>
-            <a:endParaRPr lang="fr-FR" b="1" dirty="0" smtClean="0">
+            <a:endParaRPr lang="fr-FR" b="1" dirty="0">
               <a:solidFill>
                 <a:schemeClr val="accent6"/>
               </a:solidFill>
@@ -7571,14 +6872,14 @@
           <a:p>
             <a:pPr algn="ctr"/>
             <a:r>
-              <a:rPr lang="fr-FR" i="1" u="sng" dirty="0" err="1" smtClean="0">
+              <a:rPr lang="fr-FR" i="1" u="sng" dirty="0" err="1">
                 <a:solidFill>
                   <a:schemeClr val="accent6"/>
                 </a:solidFill>
               </a:rPr>
               <a:t>CompetitionName</a:t>
             </a:r>
-            <a:endParaRPr lang="fr-FR" i="1" dirty="0" smtClean="0">
+            <a:endParaRPr lang="fr-FR" i="1" dirty="0">
               <a:solidFill>
                 <a:schemeClr val="accent6"/>
               </a:solidFill>
@@ -7587,14 +6888,14 @@
           <a:p>
             <a:pPr algn="ctr"/>
             <a:r>
-              <a:rPr lang="fr-FR" i="1" u="sng" dirty="0" err="1" smtClean="0">
+              <a:rPr lang="fr-FR" i="1" u="sng" dirty="0" err="1">
                 <a:solidFill>
                   <a:schemeClr val="accent6"/>
                 </a:solidFill>
               </a:rPr>
               <a:t>PointType</a:t>
             </a:r>
-            <a:endParaRPr lang="fr-FR" i="1" u="sng" dirty="0" smtClean="0">
+            <a:endParaRPr lang="fr-FR" i="1" u="sng" dirty="0">
               <a:solidFill>
                 <a:schemeClr val="accent6"/>
               </a:solidFill>
@@ -7603,7 +6904,7 @@
           <a:p>
             <a:pPr algn="ctr"/>
             <a:r>
-              <a:rPr lang="fr-FR" i="1" dirty="0" smtClean="0">
+              <a:rPr lang="fr-FR" i="1" dirty="0">
                 <a:solidFill>
                   <a:schemeClr val="accent6"/>
                 </a:solidFill>
@@ -7614,14 +6915,14 @@
           <a:p>
             <a:pPr algn="ctr"/>
             <a:r>
-              <a:rPr lang="fr-FR" i="1" dirty="0" err="1" smtClean="0">
+              <a:rPr lang="fr-FR" i="1" dirty="0" err="1">
                 <a:solidFill>
                   <a:schemeClr val="accent6"/>
                 </a:solidFill>
               </a:rPr>
               <a:t>Level</a:t>
             </a:r>
-            <a:endParaRPr lang="fr-FR" i="1" dirty="0" smtClean="0">
+            <a:endParaRPr lang="fr-FR" i="1" dirty="0">
               <a:solidFill>
                 <a:schemeClr val="accent6"/>
               </a:solidFill>
@@ -7630,7 +6931,7 @@
           <a:p>
             <a:pPr algn="ctr"/>
             <a:r>
-              <a:rPr lang="fr-FR" i="1" dirty="0" smtClean="0">
+              <a:rPr lang="fr-FR" i="1" dirty="0">
                 <a:solidFill>
                   <a:schemeClr val="accent6"/>
                 </a:solidFill>
@@ -7638,14 +6939,14 @@
               <a:t> </a:t>
             </a:r>
             <a:r>
-              <a:rPr lang="fr-FR" i="1" dirty="0" err="1" smtClean="0">
+              <a:rPr lang="fr-FR" i="1" dirty="0" err="1">
                 <a:solidFill>
                   <a:schemeClr val="accent6"/>
                 </a:solidFill>
               </a:rPr>
               <a:t>FinalType</a:t>
             </a:r>
-            <a:endParaRPr lang="fr-FR" i="1" dirty="0" smtClean="0">
+            <a:endParaRPr lang="fr-FR" i="1" dirty="0">
               <a:solidFill>
                 <a:schemeClr val="accent6"/>
               </a:solidFill>
@@ -7654,14 +6955,14 @@
           <a:p>
             <a:pPr algn="ctr"/>
             <a:r>
-              <a:rPr lang="fr-FR" i="1" dirty="0" err="1" smtClean="0">
+              <a:rPr lang="fr-FR" i="1" dirty="0" err="1">
                 <a:solidFill>
                   <a:schemeClr val="accent6"/>
                 </a:solidFill>
               </a:rPr>
               <a:t>SimplifiedCompetitionPhase</a:t>
             </a:r>
-            <a:endParaRPr lang="fr-FR" i="1" dirty="0" smtClean="0">
+            <a:endParaRPr lang="fr-FR" i="1" dirty="0">
               <a:solidFill>
                 <a:schemeClr val="accent6"/>
               </a:solidFill>
@@ -7670,7 +6971,7 @@
           <a:p>
             <a:pPr algn="ctr"/>
             <a:r>
-              <a:rPr lang="fr-FR" i="1" dirty="0" smtClean="0">
+              <a:rPr lang="fr-FR" i="1" dirty="0">
                 <a:solidFill>
                   <a:schemeClr val="accent6"/>
                 </a:solidFill>
@@ -7678,7 +6979,7 @@
               <a:t>Autres champs dépendants du type de calcul de points (ex: </a:t>
             </a:r>
             <a:r>
-              <a:rPr lang="fr-FR" i="1" dirty="0" err="1" smtClean="0">
+              <a:rPr lang="fr-FR" i="1" dirty="0" err="1">
                 <a:solidFill>
                   <a:schemeClr val="accent6"/>
                 </a:solidFill>
@@ -7686,7 +6987,7 @@
               <a:t>tpsBase</a:t>
             </a:r>
             <a:r>
-              <a:rPr lang="fr-FR" i="1" dirty="0" smtClean="0">
+              <a:rPr lang="fr-FR" i="1" dirty="0">
                 <a:solidFill>
                   <a:schemeClr val="accent6"/>
                 </a:solidFill>
@@ -7694,7 +6995,7 @@
               <a:t>, </a:t>
             </a:r>
             <a:r>
-              <a:rPr lang="fr-FR" i="1" dirty="0" err="1" smtClean="0">
+              <a:rPr lang="fr-FR" i="1" dirty="0" err="1">
                 <a:solidFill>
                   <a:schemeClr val="accent6"/>
                 </a:solidFill>
@@ -7702,7 +7003,7 @@
               <a:t>penManqueCompetiteurs</a:t>
             </a:r>
             <a:r>
-              <a:rPr lang="fr-FR" i="1" dirty="0" smtClean="0">
+              <a:rPr lang="fr-FR" i="1" dirty="0">
                 <a:solidFill>
                   <a:schemeClr val="accent6"/>
                 </a:solidFill>
@@ -7722,13 +7023,6 @@
   <p:clrMapOvr>
     <a:masterClrMapping/>
   </p:clrMapOvr>
-  <p:timing>
-    <p:tnLst>
-      <p:par>
-        <p:cTn id="1" dur="indefinite" restart="never" nodeType="tmRoot"/>
-      </p:par>
-    </p:tnLst>
-  </p:timing>
 </p:sld>
 </file>
 
@@ -7766,10 +7060,9 @@
           <a:p>
             <a:pPr algn="ctr"/>
             <a:r>
-              <a:rPr lang="fr-FR" dirty="0" smtClean="0"/>
+              <a:rPr lang="fr-FR" dirty="0"/>
               <a:t>Description des éléments de la BDD</a:t>
             </a:r>
-            <a:endParaRPr lang="fr-FR" dirty="0"/>
           </a:p>
         </p:txBody>
       </p:sp>
@@ -7780,7 +7073,7 @@
           <p:nvPr>
             <p:extLst>
               <p:ext uri="{D42A27DB-BD31-4B8C-83A1-F6EECF244321}">
-                <p14:modId xmlns:p14="http://schemas.microsoft.com/office/powerpoint/2010/main" val="3489263937"/>
+                <p14:modId xmlns:p14="http://schemas.microsoft.com/office/powerpoint/2010/main" val="3576170945"/>
               </p:ext>
             </p:extLst>
           </p:nvPr>
@@ -7805,13 +7098,6 @@
   <p:clrMapOvr>
     <a:masterClrMapping/>
   </p:clrMapOvr>
-  <p:timing>
-    <p:tnLst>
-      <p:par>
-        <p:cTn id="1" dur="indefinite" restart="never" nodeType="tmRoot"/>
-      </p:par>
-    </p:tnLst>
-  </p:timing>
 </p:sld>
 </file>
 
@@ -7849,10 +7135,9 @@
           <a:p>
             <a:pPr algn="ctr"/>
             <a:r>
-              <a:rPr lang="fr-FR" dirty="0" smtClean="0"/>
+              <a:rPr lang="fr-FR" dirty="0"/>
               <a:t>Contrat d’interface des calculateurs de points</a:t>
             </a:r>
-            <a:endParaRPr lang="fr-FR" dirty="0"/>
           </a:p>
         </p:txBody>
       </p:sp>
@@ -7883,20 +7168,20 @@
               <a:buChar char="•"/>
             </a:pPr>
             <a:r>
-              <a:rPr lang="fr-FR" dirty="0" smtClean="0"/>
+              <a:rPr lang="fr-FR" dirty="0"/>
               <a:t>Classe avec la méthode </a:t>
             </a:r>
             <a:r>
-              <a:rPr lang="fr-FR" dirty="0" err="1" smtClean="0"/>
+              <a:rPr lang="fr-FR" dirty="0" err="1"/>
               <a:t>compute_points</a:t>
             </a:r>
             <a:r>
-              <a:rPr lang="fr-FR" dirty="0" smtClean="0"/>
+              <a:rPr lang="fr-FR" dirty="0"/>
               <a:t>(participations)</a:t>
             </a:r>
           </a:p>
           <a:p>
-            <a:endParaRPr lang="fr-FR" dirty="0" smtClean="0"/>
+            <a:endParaRPr lang="fr-FR" dirty="0"/>
           </a:p>
           <a:p>
             <a:pPr marL="285750" indent="-285750">
@@ -7904,7 +7189,7 @@
               <a:buChar char="•"/>
             </a:pPr>
             <a:r>
-              <a:rPr lang="fr-FR" dirty="0" smtClean="0"/>
+              <a:rPr lang="fr-FR" dirty="0"/>
               <a:t>Entrée</a:t>
             </a:r>
           </a:p>
@@ -7914,31 +7199,31 @@
               <a:buChar char="•"/>
             </a:pPr>
             <a:r>
-              <a:rPr lang="fr-FR" dirty="0" smtClean="0"/>
+              <a:rPr lang="fr-FR" dirty="0"/>
               <a:t>Un </a:t>
             </a:r>
             <a:r>
-              <a:rPr lang="fr-FR" dirty="0" err="1" smtClean="0"/>
+              <a:rPr lang="fr-FR" dirty="0" err="1"/>
               <a:t>pymongo</a:t>
             </a:r>
             <a:r>
-              <a:rPr lang="fr-FR" dirty="0" smtClean="0"/>
+              <a:rPr lang="fr-FR" dirty="0"/>
               <a:t> </a:t>
             </a:r>
             <a:r>
-              <a:rPr lang="fr-FR" dirty="0" err="1" smtClean="0"/>
+              <a:rPr lang="fr-FR" dirty="0" err="1"/>
               <a:t>cursor</a:t>
             </a:r>
             <a:r>
-              <a:rPr lang="fr-FR" dirty="0" smtClean="0"/>
+              <a:rPr lang="fr-FR" dirty="0"/>
               <a:t> qui permet d’itérer sur les participations à la compétition. Ces participations comportent les valeurs utiles au calcul de points. (TODO : les participations comportent aussi le rang au classement si la variable NEED_RANKING de la classe est à </a:t>
             </a:r>
             <a:r>
-              <a:rPr lang="fr-FR" dirty="0" err="1" smtClean="0"/>
+              <a:rPr lang="fr-FR" dirty="0" err="1"/>
               <a:t>True</a:t>
             </a:r>
             <a:r>
-              <a:rPr lang="fr-FR" dirty="0" smtClean="0"/>
+              <a:rPr lang="fr-FR" dirty="0"/>
               <a:t>)</a:t>
             </a:r>
           </a:p>
@@ -7948,15 +7233,15 @@
               <a:buChar char="•"/>
             </a:pPr>
             <a:r>
-              <a:rPr lang="fr-FR" dirty="0" smtClean="0"/>
+              <a:rPr lang="fr-FR" dirty="0"/>
               <a:t>Le </a:t>
             </a:r>
             <a:r>
-              <a:rPr lang="fr-FR" dirty="0" err="1" smtClean="0"/>
+              <a:rPr lang="fr-FR" dirty="0" err="1"/>
               <a:t>value_accessor</a:t>
             </a:r>
             <a:r>
-              <a:rPr lang="fr-FR" dirty="0" smtClean="0"/>
+              <a:rPr lang="fr-FR" dirty="0"/>
               <a:t> (afin de simuler les moyennes après course si nécessaire)</a:t>
             </a:r>
           </a:p>
@@ -7969,29 +7254,29 @@
               <a:buChar char="•"/>
             </a:pPr>
             <a:r>
-              <a:rPr lang="fr-FR" dirty="0" smtClean="0"/>
+              <a:rPr lang="fr-FR" dirty="0"/>
               <a:t>Sortie</a:t>
             </a:r>
           </a:p>
           <a:p>
             <a:r>
-              <a:rPr lang="fr-FR" dirty="0" smtClean="0"/>
+              <a:rPr lang="fr-FR" dirty="0"/>
               <a:t>Une liste de dictionnaires, de la forme {« </a:t>
             </a:r>
             <a:r>
-              <a:rPr lang="fr-FR" dirty="0" err="1" smtClean="0"/>
+              <a:rPr lang="fr-FR" dirty="0" err="1"/>
               <a:t>competitorName</a:t>
             </a:r>
             <a:r>
-              <a:rPr lang="fr-FR" dirty="0" smtClean="0"/>
+              <a:rPr lang="fr-FR" dirty="0"/>
               <a:t> »:nom, « </a:t>
             </a:r>
             <a:r>
-              <a:rPr lang="fr-FR" dirty="0" err="1" smtClean="0"/>
+              <a:rPr lang="fr-FR" dirty="0" err="1"/>
               <a:t>competitorCategory</a:t>
             </a:r>
             <a:r>
-              <a:rPr lang="fr-FR" dirty="0" smtClean="0"/>
+              <a:rPr lang="fr-FR" dirty="0"/>
               <a:t> »:cat, « points »:points}</a:t>
             </a:r>
           </a:p>
@@ -8004,24 +7289,23 @@
               <a:buChar char="•"/>
             </a:pPr>
             <a:r>
-              <a:rPr lang="fr-FR" dirty="0" smtClean="0"/>
+              <a:rPr lang="fr-FR" dirty="0"/>
               <a:t>Exceptions</a:t>
             </a:r>
           </a:p>
           <a:p>
             <a:r>
-              <a:rPr lang="fr-FR" dirty="0" smtClean="0"/>
+              <a:rPr lang="fr-FR" dirty="0"/>
               <a:t>En cas d’impossibilité de calculer les points (pas assez de compétiteurs ou autre raison), une exception </a:t>
             </a:r>
             <a:r>
-              <a:rPr lang="fr-FR" dirty="0" err="1" smtClean="0"/>
+              <a:rPr lang="fr-FR" dirty="0" err="1"/>
               <a:t>ImpossiblePointsComputingException</a:t>
             </a:r>
             <a:r>
-              <a:rPr lang="fr-FR" dirty="0" smtClean="0"/>
+              <a:rPr lang="fr-FR" dirty="0"/>
               <a:t> est levée.</a:t>
             </a:r>
-            <a:endParaRPr lang="fr-FR" dirty="0"/>
           </a:p>
         </p:txBody>
       </p:sp>
@@ -8035,13 +7319,6 @@
   <p:clrMapOvr>
     <a:masterClrMapping/>
   </p:clrMapOvr>
-  <p:timing>
-    <p:tnLst>
-      <p:par>
-        <p:cTn id="1" dur="indefinite" restart="never" nodeType="tmRoot"/>
-      </p:par>
-    </p:tnLst>
-  </p:timing>
 </p:sld>
 </file>
 

</xml_diff>

<commit_message>
ajout des endpoints de la la liste des participations des athlètes
</commit_message>
<xml_diff>
--- a/documentation/architecture logicielle.pptx
+++ b/documentation/architecture logicielle.pptx
@@ -922,7 +922,7 @@
         <a:p>
           <a:r>
             <a:rPr lang="fr-FR" dirty="0"/>
-            <a:t>Est créée lors du </a:t>
+            <a:t>Permet de sauvegarder les éléments inhérents à la participation (nom, catégorie, temps, type de finale), les éléments relatifs à la compétition (nom course, date, niveau, phase) ainsi que les éléments du calcul de points réalisé (valeur, points). Ces infos sont sauvegardées lors du </a:t>
           </a:r>
           <a:r>
             <a:rPr lang="fr-FR" dirty="0" err="1"/>
@@ -944,47 +944,6 @@
       </dgm:t>
     </dgm:pt>
     <dgm:pt modelId="{D4761470-C4F3-4E89-A79B-011E63263C33}" type="sibTrans" cxnId="{6D967A63-A883-4DA6-AD78-97C76E8DA12F}">
-      <dgm:prSet/>
-      <dgm:spPr/>
-      <dgm:t>
-        <a:bodyPr/>
-        <a:lstStyle/>
-        <a:p>
-          <a:endParaRPr lang="fr-FR"/>
-        </a:p>
-      </dgm:t>
-    </dgm:pt>
-    <dgm:pt modelId="{5AC2733D-08BF-4115-99BD-F3FB1F511E87}">
-      <dgm:prSet phldrT="[Texte]"/>
-      <dgm:spPr/>
-      <dgm:t>
-        <a:bodyPr/>
-        <a:lstStyle/>
-        <a:p>
-          <a:r>
-            <a:rPr lang="fr-FR" dirty="0"/>
-            <a:t>Permet de sauvegarder les éléments inhérents à la participation (nom, catégorie, temps, type de finale), les éléments relatifs à la compétition (nom course, date, niveau, phase) ainsi que les éléments du calcul de points réalisé (valeur, points). Ces infos sont sauvegardées lors du </a:t>
-          </a:r>
-          <a:r>
-            <a:rPr lang="fr-FR" dirty="0" err="1"/>
-            <a:t>scrapping</a:t>
-          </a:r>
-          <a:endParaRPr lang="fr-FR" dirty="0"/>
-        </a:p>
-      </dgm:t>
-    </dgm:pt>
-    <dgm:pt modelId="{B55C6608-6B38-486D-AFDA-B99FAFC8B1A1}" type="parTrans" cxnId="{DC974F54-14AC-4475-BD01-080C59702A28}">
-      <dgm:prSet/>
-      <dgm:spPr/>
-      <dgm:t>
-        <a:bodyPr/>
-        <a:lstStyle/>
-        <a:p>
-          <a:endParaRPr lang="fr-FR"/>
-        </a:p>
-      </dgm:t>
-    </dgm:pt>
-    <dgm:pt modelId="{38FB9E2E-B2F4-4913-9919-02523BA4C4E9}" type="sibTrans" cxnId="{DC974F54-14AC-4475-BD01-080C59702A28}">
       <dgm:prSet/>
       <dgm:spPr/>
       <dgm:t>
@@ -1086,18 +1045,16 @@
     </dgm:pt>
   </dgm:ptLst>
   <dgm:cxnLst>
-    <dgm:cxn modelId="{60FC921D-7F4B-4474-B922-3B10780C36DF}" srcId="{D81A5FE6-BBE3-4DC9-91D6-CD4E6E66437F}" destId="{75B92DB3-302C-4E61-88F4-A9BD26AE6E08}" srcOrd="2" destOrd="0" parTransId="{EDE463E4-FD8B-4C2A-A556-3C04F3E65DBA}" sibTransId="{414694E6-FBDA-4ABC-A9FD-9D1A94106A03}"/>
-    <dgm:cxn modelId="{944E141E-9B02-4E2E-B423-C0673AB0E1EE}" type="presOf" srcId="{6AC57E1A-8322-48C0-8755-6E723587B1FC}" destId="{0CACA233-9E29-4D9B-93F2-708F46F801F6}" srcOrd="0" destOrd="3" presId="urn:microsoft.com/office/officeart/2005/8/layout/vList2"/>
-    <dgm:cxn modelId="{1F739D2F-1B9C-4267-9FF3-D2914A6097E2}" type="presOf" srcId="{5AC2733D-08BF-4115-99BD-F3FB1F511E87}" destId="{0CACA233-9E29-4D9B-93F2-708F46F801F6}" srcOrd="0" destOrd="1" presId="urn:microsoft.com/office/officeart/2005/8/layout/vList2"/>
-    <dgm:cxn modelId="{F353A937-DB60-42B3-9092-2D2B546CE5FA}" type="presOf" srcId="{D0542434-2A83-4D47-BEA6-AA18D4BCCB88}" destId="{0CACA233-9E29-4D9B-93F2-708F46F801F6}" srcOrd="0" destOrd="4" presId="urn:microsoft.com/office/officeart/2005/8/layout/vList2"/>
+    <dgm:cxn modelId="{10A6D005-2152-491D-A46A-2A7B68058B81}" type="presOf" srcId="{75B92DB3-302C-4E61-88F4-A9BD26AE6E08}" destId="{0CACA233-9E29-4D9B-93F2-708F46F801F6}" srcOrd="0" destOrd="1" presId="urn:microsoft.com/office/officeart/2005/8/layout/vList2"/>
+    <dgm:cxn modelId="{EA95321A-0B1D-4080-B632-457239AB5EE7}" type="presOf" srcId="{D0542434-2A83-4D47-BEA6-AA18D4BCCB88}" destId="{0CACA233-9E29-4D9B-93F2-708F46F801F6}" srcOrd="0" destOrd="3" presId="urn:microsoft.com/office/officeart/2005/8/layout/vList2"/>
+    <dgm:cxn modelId="{60FC921D-7F4B-4474-B922-3B10780C36DF}" srcId="{D81A5FE6-BBE3-4DC9-91D6-CD4E6E66437F}" destId="{75B92DB3-302C-4E61-88F4-A9BD26AE6E08}" srcOrd="1" destOrd="0" parTransId="{EDE463E4-FD8B-4C2A-A556-3C04F3E65DBA}" sibTransId="{414694E6-FBDA-4ABC-A9FD-9D1A94106A03}"/>
     <dgm:cxn modelId="{9062863E-6886-4CB2-9507-F9C7DF335AB5}" type="presOf" srcId="{A14994A2-4572-466F-BA44-05EFFA04BD95}" destId="{0CACA233-9E29-4D9B-93F2-708F46F801F6}" srcOrd="0" destOrd="0" presId="urn:microsoft.com/office/officeart/2005/8/layout/vList2"/>
+    <dgm:cxn modelId="{46D29462-1AA0-454E-B708-4DF81FD56F81}" type="presOf" srcId="{6AC57E1A-8322-48C0-8755-6E723587B1FC}" destId="{0CACA233-9E29-4D9B-93F2-708F46F801F6}" srcOrd="0" destOrd="2" presId="urn:microsoft.com/office/officeart/2005/8/layout/vList2"/>
     <dgm:cxn modelId="{6D967A63-A883-4DA6-AD78-97C76E8DA12F}" srcId="{D81A5FE6-BBE3-4DC9-91D6-CD4E6E66437F}" destId="{A14994A2-4572-466F-BA44-05EFFA04BD95}" srcOrd="0" destOrd="0" parTransId="{17D0A7BF-55D8-424A-BEB5-C4A6E0E9DDBC}" sibTransId="{D4761470-C4F3-4E89-A79B-011E63263C33}"/>
-    <dgm:cxn modelId="{C5150D4C-6D20-4F15-A8B9-6A09FAE454BF}" type="presOf" srcId="{75B92DB3-302C-4E61-88F4-A9BD26AE6E08}" destId="{0CACA233-9E29-4D9B-93F2-708F46F801F6}" srcOrd="0" destOrd="2" presId="urn:microsoft.com/office/officeart/2005/8/layout/vList2"/>
-    <dgm:cxn modelId="{DC974F54-14AC-4475-BD01-080C59702A28}" srcId="{D81A5FE6-BBE3-4DC9-91D6-CD4E6E66437F}" destId="{5AC2733D-08BF-4115-99BD-F3FB1F511E87}" srcOrd="1" destOrd="0" parTransId="{B55C6608-6B38-486D-AFDA-B99FAFC8B1A1}" sibTransId="{38FB9E2E-B2F4-4913-9919-02523BA4C4E9}"/>
-    <dgm:cxn modelId="{B34E558D-1449-4511-BD16-1D195196895C}" srcId="{D81A5FE6-BBE3-4DC9-91D6-CD4E6E66437F}" destId="{6AC57E1A-8322-48C0-8755-6E723587B1FC}" srcOrd="3" destOrd="0" parTransId="{D4BB04EC-8228-4093-BE6D-7C89AFC000F2}" sibTransId="{C8F4FE23-72D4-4AFC-8E4A-F542BD0E3763}"/>
+    <dgm:cxn modelId="{B34E558D-1449-4511-BD16-1D195196895C}" srcId="{D81A5FE6-BBE3-4DC9-91D6-CD4E6E66437F}" destId="{6AC57E1A-8322-48C0-8755-6E723587B1FC}" srcOrd="2" destOrd="0" parTransId="{D4BB04EC-8228-4093-BE6D-7C89AFC000F2}" sibTransId="{C8F4FE23-72D4-4AFC-8E4A-F542BD0E3763}"/>
     <dgm:cxn modelId="{FC3D98B3-0823-4776-8B43-F6077CB9D606}" srcId="{200188F1-A6D4-492C-BCDF-87516FC64D91}" destId="{D81A5FE6-BBE3-4DC9-91D6-CD4E6E66437F}" srcOrd="0" destOrd="0" parTransId="{8869F334-3F8D-495D-8AAC-E5DD5959DC52}" sibTransId="{6E44C864-F5C4-4C5F-808A-EC357542073D}"/>
     <dgm:cxn modelId="{8F4319BA-7AD2-4F18-BD49-AFC52B06E812}" type="presOf" srcId="{D81A5FE6-BBE3-4DC9-91D6-CD4E6E66437F}" destId="{B07E5410-78A9-4D6D-BF5B-A06354D9BFD7}" srcOrd="0" destOrd="0" presId="urn:microsoft.com/office/officeart/2005/8/layout/vList2"/>
-    <dgm:cxn modelId="{D6F774E0-8B51-48BE-9631-F0B1FFD4D337}" srcId="{D81A5FE6-BBE3-4DC9-91D6-CD4E6E66437F}" destId="{D0542434-2A83-4D47-BEA6-AA18D4BCCB88}" srcOrd="4" destOrd="0" parTransId="{0C143F8B-9D55-41DA-B42D-5A49DA4956CE}" sibTransId="{4764EB9C-D759-4B58-B6E1-B8EBE0699A38}"/>
+    <dgm:cxn modelId="{D6F774E0-8B51-48BE-9631-F0B1FFD4D337}" srcId="{D81A5FE6-BBE3-4DC9-91D6-CD4E6E66437F}" destId="{D0542434-2A83-4D47-BEA6-AA18D4BCCB88}" srcOrd="3" destOrd="0" parTransId="{0C143F8B-9D55-41DA-B42D-5A49DA4956CE}" sibTransId="{4764EB9C-D759-4B58-B6E1-B8EBE0699A38}"/>
     <dgm:cxn modelId="{D0E5FCFF-C3DD-457E-9245-19439B3B069B}" type="presOf" srcId="{200188F1-A6D4-492C-BCDF-87516FC64D91}" destId="{7C1DF500-77D3-4D50-B518-AEB29184D80B}" srcOrd="0" destOrd="0" presId="urn:microsoft.com/office/officeart/2005/8/layout/vList2"/>
     <dgm:cxn modelId="{F9B882E0-5202-48AB-BC5E-D66D05F8919F}" type="presParOf" srcId="{7C1DF500-77D3-4D50-B518-AEB29184D80B}" destId="{B07E5410-78A9-4D6D-BF5B-A06354D9BFD7}" srcOrd="0" destOrd="0" presId="urn:microsoft.com/office/officeart/2005/8/layout/vList2"/>
     <dgm:cxn modelId="{302A7AEA-A1C8-4F9D-AE22-708CE2B71263}" type="presParOf" srcId="{7C1DF500-77D3-4D50-B518-AEB29184D80B}" destId="{0CACA233-9E29-4D9B-93F2-708F46F801F6}" srcOrd="1" destOrd="0" presId="urn:microsoft.com/office/officeart/2005/8/layout/vList2"/>
@@ -1127,8 +1084,8 @@
       </dsp:nvSpPr>
       <dsp:spPr>
         <a:xfrm>
-          <a:off x="0" y="59351"/>
-          <a:ext cx="10874104" cy="791505"/>
+          <a:off x="0" y="44500"/>
+          <a:ext cx="10874104" cy="887445"/>
         </a:xfrm>
         <a:prstGeom prst="roundRect">
           <a:avLst/>
@@ -1170,12 +1127,12 @@
         </a:fontRef>
       </dsp:style>
       <dsp:txBody>
-        <a:bodyPr spcFirstLastPara="0" vert="horz" wrap="square" lIns="125730" tIns="125730" rIns="125730" bIns="125730" numCol="1" spcCol="1270" anchor="ctr" anchorCtr="0">
+        <a:bodyPr spcFirstLastPara="0" vert="horz" wrap="square" lIns="140970" tIns="140970" rIns="140970" bIns="140970" numCol="1" spcCol="1270" anchor="ctr" anchorCtr="0">
           <a:noAutofit/>
         </a:bodyPr>
         <a:lstStyle/>
         <a:p>
-          <a:pPr marL="0" lvl="0" indent="0" algn="l" defTabSz="1466850">
+          <a:pPr marL="0" lvl="0" indent="0" algn="l" defTabSz="1644650">
             <a:lnSpc>
               <a:spcPct val="90000"/>
             </a:lnSpc>
@@ -1188,14 +1145,14 @@
             <a:buNone/>
           </a:pPr>
           <a:r>
-            <a:rPr lang="fr-FR" sz="3300" kern="1200" dirty="0"/>
+            <a:rPr lang="fr-FR" sz="3700" kern="1200" dirty="0"/>
             <a:t>Participation</a:t>
           </a:r>
         </a:p>
       </dsp:txBody>
       <dsp:txXfrm>
-        <a:off x="38638" y="97989"/>
-        <a:ext cx="10796828" cy="714229"/>
+        <a:off x="43321" y="87821"/>
+        <a:ext cx="10787462" cy="800803"/>
       </dsp:txXfrm>
     </dsp:sp>
     <dsp:sp modelId="{0CACA233-9E29-4D9B-93F2-708F46F801F6}">
@@ -1205,8 +1162,8 @@
       </dsp:nvSpPr>
       <dsp:spPr>
         <a:xfrm>
-          <a:off x="0" y="850856"/>
-          <a:ext cx="10874104" cy="4508460"/>
+          <a:off x="0" y="931946"/>
+          <a:ext cx="10874104" cy="4442220"/>
         </a:xfrm>
         <a:prstGeom prst="rect">
           <a:avLst/>
@@ -1230,12 +1187,12 @@
         <a:fontRef idx="minor"/>
       </dsp:style>
       <dsp:txBody>
-        <a:bodyPr spcFirstLastPara="0" vert="horz" wrap="square" lIns="345253" tIns="41910" rIns="234696" bIns="41910" numCol="1" spcCol="1270" anchor="t" anchorCtr="0">
+        <a:bodyPr spcFirstLastPara="0" vert="horz" wrap="square" lIns="345253" tIns="46990" rIns="263144" bIns="46990" numCol="1" spcCol="1270" anchor="t" anchorCtr="0">
           <a:noAutofit/>
         </a:bodyPr>
         <a:lstStyle/>
         <a:p>
-          <a:pPr marL="228600" lvl="1" indent="-228600" algn="l" defTabSz="1155700">
+          <a:pPr marL="285750" lvl="1" indent="-285750" algn="l" defTabSz="1289050">
             <a:lnSpc>
               <a:spcPct val="90000"/>
             </a:lnSpc>
@@ -1248,17 +1205,17 @@
             <a:buChar char="•"/>
           </a:pPr>
           <a:r>
-            <a:rPr lang="fr-FR" sz="2600" kern="1200" dirty="0"/>
-            <a:t>Est créée lors du </a:t>
+            <a:rPr lang="fr-FR" sz="2900" kern="1200" dirty="0"/>
+            <a:t>Permet de sauvegarder les éléments inhérents à la participation (nom, catégorie, temps, type de finale), les éléments relatifs à la compétition (nom course, date, niveau, phase) ainsi que les éléments du calcul de points réalisé (valeur, points). Ces infos sont sauvegardées lors du </a:t>
           </a:r>
           <a:r>
-            <a:rPr lang="fr-FR" sz="2600" kern="1200" dirty="0" err="1"/>
+            <a:rPr lang="fr-FR" sz="2900" kern="1200" dirty="0" err="1"/>
             <a:t>scrapping</a:t>
           </a:r>
-          <a:endParaRPr lang="fr-FR" sz="2600" kern="1200" dirty="0"/>
+          <a:endParaRPr lang="fr-FR" sz="2900" kern="1200" dirty="0"/>
         </a:p>
         <a:p>
-          <a:pPr marL="228600" lvl="1" indent="-228600" algn="l" defTabSz="1155700">
+          <a:pPr marL="285750" lvl="1" indent="-285750" algn="l" defTabSz="1289050">
             <a:lnSpc>
               <a:spcPct val="90000"/>
             </a:lnSpc>
@@ -1271,17 +1228,12 @@
             <a:buChar char="•"/>
           </a:pPr>
           <a:r>
-            <a:rPr lang="fr-FR" sz="2600" kern="1200" dirty="0"/>
-            <a:t>Permet de sauvegarder les éléments inhérents à la participation (nom, catégorie, temps, type de finale), les éléments relatifs à la compétition (nom course, date, niveau, phase) ainsi que les éléments du calcul de points réalisé (valeur, points). Ces infos sont sauvegardées lors du </a:t>
+            <a:rPr lang="fr-FR" sz="2900" kern="1200" dirty="0"/>
+            <a:t>Permet de sauvegarder les informations calculées pour les différents calculs de points : valeur et points</a:t>
           </a:r>
-          <a:r>
-            <a:rPr lang="fr-FR" sz="2600" kern="1200" dirty="0" err="1"/>
-            <a:t>scrapping</a:t>
-          </a:r>
-          <a:endParaRPr lang="fr-FR" sz="2600" kern="1200" dirty="0"/>
         </a:p>
         <a:p>
-          <a:pPr marL="228600" lvl="1" indent="-228600" algn="l" defTabSz="1155700">
+          <a:pPr marL="285750" lvl="1" indent="-285750" algn="l" defTabSz="1289050">
             <a:lnSpc>
               <a:spcPct val="90000"/>
             </a:lnSpc>
@@ -1294,12 +1246,12 @@
             <a:buChar char="•"/>
           </a:pPr>
           <a:r>
-            <a:rPr lang="fr-FR" sz="2600" kern="1200" dirty="0"/>
-            <a:t>Permet de sauvegarder les informations calculées pour les différents calculs de points : valeur et points</a:t>
+            <a:rPr lang="fr-FR" sz="2900" kern="1200" dirty="0"/>
+            <a:t>Utilisation cible : lors du calcul de points, lors de l’affichage des compétitions réalisées par un athlète</a:t>
           </a:r>
         </a:p>
         <a:p>
-          <a:pPr marL="228600" lvl="1" indent="-228600" algn="l" defTabSz="1155700">
+          <a:pPr marL="285750" lvl="1" indent="-285750" algn="l" defTabSz="1289050">
             <a:lnSpc>
               <a:spcPct val="90000"/>
             </a:lnSpc>
@@ -1311,30 +1263,12 @@
             </a:spcAft>
             <a:buChar char="•"/>
           </a:pPr>
-          <a:r>
-            <a:rPr lang="fr-FR" sz="2600" kern="1200" dirty="0"/>
-            <a:t>Utilisation cible : lors du calcul de points, lors de l’affichage des compétitions réalisées par un athlète</a:t>
-          </a:r>
-        </a:p>
-        <a:p>
-          <a:pPr marL="228600" lvl="1" indent="-228600" algn="l" defTabSz="1155700">
-            <a:lnSpc>
-              <a:spcPct val="90000"/>
-            </a:lnSpc>
-            <a:spcBef>
-              <a:spcPct val="0"/>
-            </a:spcBef>
-            <a:spcAft>
-              <a:spcPct val="20000"/>
-            </a:spcAft>
-            <a:buChar char="•"/>
-          </a:pPr>
-          <a:endParaRPr lang="fr-FR" sz="2600" kern="1200" dirty="0"/>
+          <a:endParaRPr lang="fr-FR" sz="2900" kern="1200" dirty="0"/>
         </a:p>
       </dsp:txBody>
       <dsp:txXfrm>
-        <a:off x="0" y="850856"/>
-        <a:ext cx="10874104" cy="4508460"/>
+        <a:off x="0" y="931946"/>
+        <a:ext cx="10874104" cy="4442220"/>
       </dsp:txXfrm>
     </dsp:sp>
   </dsp:spTree>
@@ -2671,7 +2605,7 @@
           <a:p>
             <a:fld id="{090BB305-B547-43E9-A3C0-FBFA669CED81}" type="datetimeFigureOut">
               <a:rPr lang="fr-FR" smtClean="0"/>
-              <a:t>18/12/2021</a:t>
+              <a:t>24/12/2021</a:t>
             </a:fld>
             <a:endParaRPr lang="fr-FR"/>
           </a:p>
@@ -2839,7 +2773,7 @@
           <a:p>
             <a:fld id="{090BB305-B547-43E9-A3C0-FBFA669CED81}" type="datetimeFigureOut">
               <a:rPr lang="fr-FR" smtClean="0"/>
-              <a:t>18/12/2021</a:t>
+              <a:t>24/12/2021</a:t>
             </a:fld>
             <a:endParaRPr lang="fr-FR"/>
           </a:p>
@@ -3017,7 +2951,7 @@
           <a:p>
             <a:fld id="{090BB305-B547-43E9-A3C0-FBFA669CED81}" type="datetimeFigureOut">
               <a:rPr lang="fr-FR" smtClean="0"/>
-              <a:t>18/12/2021</a:t>
+              <a:t>24/12/2021</a:t>
             </a:fld>
             <a:endParaRPr lang="fr-FR"/>
           </a:p>
@@ -3185,7 +3119,7 @@
           <a:p>
             <a:fld id="{090BB305-B547-43E9-A3C0-FBFA669CED81}" type="datetimeFigureOut">
               <a:rPr lang="fr-FR" smtClean="0"/>
-              <a:t>18/12/2021</a:t>
+              <a:t>24/12/2021</a:t>
             </a:fld>
             <a:endParaRPr lang="fr-FR"/>
           </a:p>
@@ -3430,7 +3364,7 @@
           <a:p>
             <a:fld id="{090BB305-B547-43E9-A3C0-FBFA669CED81}" type="datetimeFigureOut">
               <a:rPr lang="fr-FR" smtClean="0"/>
-              <a:t>18/12/2021</a:t>
+              <a:t>24/12/2021</a:t>
             </a:fld>
             <a:endParaRPr lang="fr-FR"/>
           </a:p>
@@ -3659,7 +3593,7 @@
           <a:p>
             <a:fld id="{090BB305-B547-43E9-A3C0-FBFA669CED81}" type="datetimeFigureOut">
               <a:rPr lang="fr-FR" smtClean="0"/>
-              <a:t>18/12/2021</a:t>
+              <a:t>24/12/2021</a:t>
             </a:fld>
             <a:endParaRPr lang="fr-FR"/>
           </a:p>
@@ -4023,7 +3957,7 @@
           <a:p>
             <a:fld id="{090BB305-B547-43E9-A3C0-FBFA669CED81}" type="datetimeFigureOut">
               <a:rPr lang="fr-FR" smtClean="0"/>
-              <a:t>18/12/2021</a:t>
+              <a:t>24/12/2021</a:t>
             </a:fld>
             <a:endParaRPr lang="fr-FR"/>
           </a:p>
@@ -4140,7 +4074,7 @@
           <a:p>
             <a:fld id="{090BB305-B547-43E9-A3C0-FBFA669CED81}" type="datetimeFigureOut">
               <a:rPr lang="fr-FR" smtClean="0"/>
-              <a:t>18/12/2021</a:t>
+              <a:t>24/12/2021</a:t>
             </a:fld>
             <a:endParaRPr lang="fr-FR"/>
           </a:p>
@@ -4235,7 +4169,7 @@
           <a:p>
             <a:fld id="{090BB305-B547-43E9-A3C0-FBFA669CED81}" type="datetimeFigureOut">
               <a:rPr lang="fr-FR" smtClean="0"/>
-              <a:t>18/12/2021</a:t>
+              <a:t>24/12/2021</a:t>
             </a:fld>
             <a:endParaRPr lang="fr-FR"/>
           </a:p>
@@ -4510,7 +4444,7 @@
           <a:p>
             <a:fld id="{090BB305-B547-43E9-A3C0-FBFA669CED81}" type="datetimeFigureOut">
               <a:rPr lang="fr-FR" smtClean="0"/>
-              <a:t>18/12/2021</a:t>
+              <a:t>24/12/2021</a:t>
             </a:fld>
             <a:endParaRPr lang="fr-FR"/>
           </a:p>
@@ -4762,7 +4696,7 @@
           <a:p>
             <a:fld id="{090BB305-B547-43E9-A3C0-FBFA669CED81}" type="datetimeFigureOut">
               <a:rPr lang="fr-FR" smtClean="0"/>
-              <a:t>18/12/2021</a:t>
+              <a:t>24/12/2021</a:t>
             </a:fld>
             <a:endParaRPr lang="fr-FR"/>
           </a:p>
@@ -4973,7 +4907,7 @@
           <a:p>
             <a:fld id="{090BB305-B547-43E9-A3C0-FBFA669CED81}" type="datetimeFigureOut">
               <a:rPr lang="fr-FR" smtClean="0"/>
-              <a:t>18/12/2021</a:t>
+              <a:t>24/12/2021</a:t>
             </a:fld>
             <a:endParaRPr lang="fr-FR"/>
           </a:p>
@@ -5749,20 +5683,20 @@
           <a:p>
             <a:pPr algn="ctr"/>
             <a:r>
+              <a:rPr lang="fr-FR" sz="2400" b="1" u="sng" dirty="0" err="1"/>
+              <a:t>Flask_app</a:t>
+            </a:r>
+            <a:r>
               <a:rPr lang="fr-FR" sz="2400" b="1" u="sng" dirty="0"/>
-              <a:t>Cockpit :</a:t>
+              <a:t> :</a:t>
             </a:r>
           </a:p>
           <a:p>
             <a:pPr algn="ctr"/>
             <a:r>
               <a:rPr lang="fr-FR" dirty="0"/>
-              <a:t>Permet la visualisation des données</a:t>
-            </a:r>
-          </a:p>
-          <a:p>
-            <a:pPr algn="ctr"/>
-            <a:endParaRPr lang="fr-FR" dirty="0"/>
+              <a:t>Met les données à disposition via une API</a:t>
+            </a:r>
           </a:p>
         </p:txBody>
       </p:sp>
@@ -5818,7 +5752,7 @@
             <a:pPr algn="ctr"/>
             <a:r>
               <a:rPr lang="fr-FR" dirty="0"/>
-              <a:t>Récupère la valeur de l’athlète souhaité à la date voulue si celle-ci existe ou la calcule dans le cas contraire</a:t>
+              <a:t>Calcule la valeur de l’athlète souhaité à la date voulue et permet de comparer différentes valeurs</a:t>
             </a:r>
           </a:p>
         </p:txBody>
@@ -5954,42 +5888,6 @@
           </a:fontRef>
         </p:style>
       </p:cxnSp>
-      <p:cxnSp>
-        <p:nvCxnSpPr>
-          <p:cNvPr id="32" name="Connecteur droit avec flèche 31"/>
-          <p:cNvCxnSpPr>
-            <a:stCxn id="8" idx="1"/>
-            <a:endCxn id="7" idx="3"/>
-          </p:cNvCxnSpPr>
-          <p:nvPr/>
-        </p:nvCxnSpPr>
-        <p:spPr>
-          <a:xfrm flipH="1" flipV="1">
-            <a:off x="3067917" y="5905230"/>
-            <a:ext cx="131184" cy="193964"/>
-          </a:xfrm>
-          <a:prstGeom prst="straightConnector1">
-            <a:avLst/>
-          </a:prstGeom>
-          <a:ln>
-            <a:tailEnd type="triangle"/>
-          </a:ln>
-        </p:spPr>
-        <p:style>
-          <a:lnRef idx="1">
-            <a:schemeClr val="accent1"/>
-          </a:lnRef>
-          <a:fillRef idx="0">
-            <a:schemeClr val="accent1"/>
-          </a:fillRef>
-          <a:effectRef idx="0">
-            <a:schemeClr val="accent1"/>
-          </a:effectRef>
-          <a:fontRef idx="minor">
-            <a:schemeClr val="tx1"/>
-          </a:fontRef>
-        </p:style>
-      </p:cxnSp>
       <p:sp>
         <p:nvSpPr>
           <p:cNvPr id="41" name="Rectangle à coins arrondis 40"/>
@@ -6042,8 +5940,13 @@
             <a:pPr algn="ctr"/>
             <a:r>
               <a:rPr lang="fr-FR" dirty="0"/>
-              <a:t>Détermine l’ordre de calcul des points</a:t>
-            </a:r>
+              <a:t>Détermine l’ordre de calcul des points et ordonne les calculs à effectuer à </a:t>
+            </a:r>
+            <a:r>
+              <a:rPr lang="fr-FR"/>
+              <a:t>PointComputer</a:t>
+            </a:r>
+            <a:endParaRPr lang="fr-FR" dirty="0"/>
           </a:p>
         </p:txBody>
       </p:sp>
@@ -7073,7 +6976,7 @@
           <p:nvPr>
             <p:extLst>
               <p:ext uri="{D42A27DB-BD31-4B8C-83A1-F6EECF244321}">
-                <p14:modId xmlns:p14="http://schemas.microsoft.com/office/powerpoint/2010/main" val="3576170945"/>
+                <p14:modId xmlns:p14="http://schemas.microsoft.com/office/powerpoint/2010/main" val="3176118951"/>
               </p:ext>
             </p:extLst>
           </p:nvPr>

</xml_diff>

<commit_message>
Récupération du classement et de la moyenne, sauvegarde jour en cours
</commit_message>
<xml_diff>
--- a/documentation/architecture logicielle.pptx
+++ b/documentation/architecture logicielle.pptx
@@ -1025,6 +1025,13 @@
         </dgm:presLayoutVars>
       </dgm:prSet>
       <dgm:spPr/>
+      <dgm:t>
+        <a:bodyPr/>
+        <a:lstStyle/>
+        <a:p>
+          <a:endParaRPr lang="fr-FR"/>
+        </a:p>
+      </dgm:t>
     </dgm:pt>
     <dgm:pt modelId="{B07E5410-78A9-4D6D-BF5B-A06354D9BFD7}" type="pres">
       <dgm:prSet presAssocID="{D81A5FE6-BBE3-4DC9-91D6-CD4E6E66437F}" presName="parentText" presStyleLbl="node1" presStyleIdx="0" presStyleCnt="1">
@@ -1034,6 +1041,13 @@
         </dgm:presLayoutVars>
       </dgm:prSet>
       <dgm:spPr/>
+      <dgm:t>
+        <a:bodyPr/>
+        <a:lstStyle/>
+        <a:p>
+          <a:endParaRPr lang="fr-FR"/>
+        </a:p>
+      </dgm:t>
     </dgm:pt>
     <dgm:pt modelId="{0CACA233-9E29-4D9B-93F2-708F46F801F6}" type="pres">
       <dgm:prSet presAssocID="{D81A5FE6-BBE3-4DC9-91D6-CD4E6E66437F}" presName="childText" presStyleLbl="revTx" presStyleIdx="0" presStyleCnt="1">
@@ -1042,20 +1056,27 @@
         </dgm:presLayoutVars>
       </dgm:prSet>
       <dgm:spPr/>
+      <dgm:t>
+        <a:bodyPr/>
+        <a:lstStyle/>
+        <a:p>
+          <a:endParaRPr lang="fr-FR"/>
+        </a:p>
+      </dgm:t>
     </dgm:pt>
   </dgm:ptLst>
   <dgm:cxnLst>
+    <dgm:cxn modelId="{EA95321A-0B1D-4080-B632-457239AB5EE7}" type="presOf" srcId="{D0542434-2A83-4D47-BEA6-AA18D4BCCB88}" destId="{0CACA233-9E29-4D9B-93F2-708F46F801F6}" srcOrd="0" destOrd="3" presId="urn:microsoft.com/office/officeart/2005/8/layout/vList2"/>
+    <dgm:cxn modelId="{46D29462-1AA0-454E-B708-4DF81FD56F81}" type="presOf" srcId="{6AC57E1A-8322-48C0-8755-6E723587B1FC}" destId="{0CACA233-9E29-4D9B-93F2-708F46F801F6}" srcOrd="0" destOrd="2" presId="urn:microsoft.com/office/officeart/2005/8/layout/vList2"/>
+    <dgm:cxn modelId="{D0E5FCFF-C3DD-457E-9245-19439B3B069B}" type="presOf" srcId="{200188F1-A6D4-492C-BCDF-87516FC64D91}" destId="{7C1DF500-77D3-4D50-B518-AEB29184D80B}" srcOrd="0" destOrd="0" presId="urn:microsoft.com/office/officeart/2005/8/layout/vList2"/>
+    <dgm:cxn modelId="{D6F774E0-8B51-48BE-9631-F0B1FFD4D337}" srcId="{D81A5FE6-BBE3-4DC9-91D6-CD4E6E66437F}" destId="{D0542434-2A83-4D47-BEA6-AA18D4BCCB88}" srcOrd="3" destOrd="0" parTransId="{0C143F8B-9D55-41DA-B42D-5A49DA4956CE}" sibTransId="{4764EB9C-D759-4B58-B6E1-B8EBE0699A38}"/>
+    <dgm:cxn modelId="{60FC921D-7F4B-4474-B922-3B10780C36DF}" srcId="{D81A5FE6-BBE3-4DC9-91D6-CD4E6E66437F}" destId="{75B92DB3-302C-4E61-88F4-A9BD26AE6E08}" srcOrd="1" destOrd="0" parTransId="{EDE463E4-FD8B-4C2A-A556-3C04F3E65DBA}" sibTransId="{414694E6-FBDA-4ABC-A9FD-9D1A94106A03}"/>
+    <dgm:cxn modelId="{FC3D98B3-0823-4776-8B43-F6077CB9D606}" srcId="{200188F1-A6D4-492C-BCDF-87516FC64D91}" destId="{D81A5FE6-BBE3-4DC9-91D6-CD4E6E66437F}" srcOrd="0" destOrd="0" parTransId="{8869F334-3F8D-495D-8AAC-E5DD5959DC52}" sibTransId="{6E44C864-F5C4-4C5F-808A-EC357542073D}"/>
     <dgm:cxn modelId="{10A6D005-2152-491D-A46A-2A7B68058B81}" type="presOf" srcId="{75B92DB3-302C-4E61-88F4-A9BD26AE6E08}" destId="{0CACA233-9E29-4D9B-93F2-708F46F801F6}" srcOrd="0" destOrd="1" presId="urn:microsoft.com/office/officeart/2005/8/layout/vList2"/>
-    <dgm:cxn modelId="{EA95321A-0B1D-4080-B632-457239AB5EE7}" type="presOf" srcId="{D0542434-2A83-4D47-BEA6-AA18D4BCCB88}" destId="{0CACA233-9E29-4D9B-93F2-708F46F801F6}" srcOrd="0" destOrd="3" presId="urn:microsoft.com/office/officeart/2005/8/layout/vList2"/>
-    <dgm:cxn modelId="{60FC921D-7F4B-4474-B922-3B10780C36DF}" srcId="{D81A5FE6-BBE3-4DC9-91D6-CD4E6E66437F}" destId="{75B92DB3-302C-4E61-88F4-A9BD26AE6E08}" srcOrd="1" destOrd="0" parTransId="{EDE463E4-FD8B-4C2A-A556-3C04F3E65DBA}" sibTransId="{414694E6-FBDA-4ABC-A9FD-9D1A94106A03}"/>
+    <dgm:cxn modelId="{8F4319BA-7AD2-4F18-BD49-AFC52B06E812}" type="presOf" srcId="{D81A5FE6-BBE3-4DC9-91D6-CD4E6E66437F}" destId="{B07E5410-78A9-4D6D-BF5B-A06354D9BFD7}" srcOrd="0" destOrd="0" presId="urn:microsoft.com/office/officeart/2005/8/layout/vList2"/>
     <dgm:cxn modelId="{9062863E-6886-4CB2-9507-F9C7DF335AB5}" type="presOf" srcId="{A14994A2-4572-466F-BA44-05EFFA04BD95}" destId="{0CACA233-9E29-4D9B-93F2-708F46F801F6}" srcOrd="0" destOrd="0" presId="urn:microsoft.com/office/officeart/2005/8/layout/vList2"/>
-    <dgm:cxn modelId="{46D29462-1AA0-454E-B708-4DF81FD56F81}" type="presOf" srcId="{6AC57E1A-8322-48C0-8755-6E723587B1FC}" destId="{0CACA233-9E29-4D9B-93F2-708F46F801F6}" srcOrd="0" destOrd="2" presId="urn:microsoft.com/office/officeart/2005/8/layout/vList2"/>
     <dgm:cxn modelId="{6D967A63-A883-4DA6-AD78-97C76E8DA12F}" srcId="{D81A5FE6-BBE3-4DC9-91D6-CD4E6E66437F}" destId="{A14994A2-4572-466F-BA44-05EFFA04BD95}" srcOrd="0" destOrd="0" parTransId="{17D0A7BF-55D8-424A-BEB5-C4A6E0E9DDBC}" sibTransId="{D4761470-C4F3-4E89-A79B-011E63263C33}"/>
     <dgm:cxn modelId="{B34E558D-1449-4511-BD16-1D195196895C}" srcId="{D81A5FE6-BBE3-4DC9-91D6-CD4E6E66437F}" destId="{6AC57E1A-8322-48C0-8755-6E723587B1FC}" srcOrd="2" destOrd="0" parTransId="{D4BB04EC-8228-4093-BE6D-7C89AFC000F2}" sibTransId="{C8F4FE23-72D4-4AFC-8E4A-F542BD0E3763}"/>
-    <dgm:cxn modelId="{FC3D98B3-0823-4776-8B43-F6077CB9D606}" srcId="{200188F1-A6D4-492C-BCDF-87516FC64D91}" destId="{D81A5FE6-BBE3-4DC9-91D6-CD4E6E66437F}" srcOrd="0" destOrd="0" parTransId="{8869F334-3F8D-495D-8AAC-E5DD5959DC52}" sibTransId="{6E44C864-F5C4-4C5F-808A-EC357542073D}"/>
-    <dgm:cxn modelId="{8F4319BA-7AD2-4F18-BD49-AFC52B06E812}" type="presOf" srcId="{D81A5FE6-BBE3-4DC9-91D6-CD4E6E66437F}" destId="{B07E5410-78A9-4D6D-BF5B-A06354D9BFD7}" srcOrd="0" destOrd="0" presId="urn:microsoft.com/office/officeart/2005/8/layout/vList2"/>
-    <dgm:cxn modelId="{D6F774E0-8B51-48BE-9631-F0B1FFD4D337}" srcId="{D81A5FE6-BBE3-4DC9-91D6-CD4E6E66437F}" destId="{D0542434-2A83-4D47-BEA6-AA18D4BCCB88}" srcOrd="3" destOrd="0" parTransId="{0C143F8B-9D55-41DA-B42D-5A49DA4956CE}" sibTransId="{4764EB9C-D759-4B58-B6E1-B8EBE0699A38}"/>
-    <dgm:cxn modelId="{D0E5FCFF-C3DD-457E-9245-19439B3B069B}" type="presOf" srcId="{200188F1-A6D4-492C-BCDF-87516FC64D91}" destId="{7C1DF500-77D3-4D50-B518-AEB29184D80B}" srcOrd="0" destOrd="0" presId="urn:microsoft.com/office/officeart/2005/8/layout/vList2"/>
     <dgm:cxn modelId="{F9B882E0-5202-48AB-BC5E-D66D05F8919F}" type="presParOf" srcId="{7C1DF500-77D3-4D50-B518-AEB29184D80B}" destId="{B07E5410-78A9-4D6D-BF5B-A06354D9BFD7}" srcOrd="0" destOrd="0" presId="urn:microsoft.com/office/officeart/2005/8/layout/vList2"/>
     <dgm:cxn modelId="{302A7AEA-A1C8-4F9D-AE22-708CE2B71263}" type="presParOf" srcId="{7C1DF500-77D3-4D50-B518-AEB29184D80B}" destId="{0CACA233-9E29-4D9B-93F2-708F46F801F6}" srcOrd="1" destOrd="0" presId="urn:microsoft.com/office/officeart/2005/8/layout/vList2"/>
   </dgm:cxnLst>
@@ -1132,7 +1153,7 @@
         </a:bodyPr>
         <a:lstStyle/>
         <a:p>
-          <a:pPr marL="0" lvl="0" indent="0" algn="l" defTabSz="1644650">
+          <a:pPr lvl="0" algn="l" defTabSz="1644650">
             <a:lnSpc>
               <a:spcPct val="90000"/>
             </a:lnSpc>
@@ -1142,7 +1163,6 @@
             <a:spcAft>
               <a:spcPct val="35000"/>
             </a:spcAft>
-            <a:buNone/>
           </a:pPr>
           <a:r>
             <a:rPr lang="fr-FR" sz="3700" kern="1200" dirty="0"/>
@@ -1202,7 +1222,7 @@
             <a:spcAft>
               <a:spcPct val="20000"/>
             </a:spcAft>
-            <a:buChar char="•"/>
+            <a:buChar char="••"/>
           </a:pPr>
           <a:r>
             <a:rPr lang="fr-FR" sz="2900" kern="1200" dirty="0"/>
@@ -1225,7 +1245,7 @@
             <a:spcAft>
               <a:spcPct val="20000"/>
             </a:spcAft>
-            <a:buChar char="•"/>
+            <a:buChar char="••"/>
           </a:pPr>
           <a:r>
             <a:rPr lang="fr-FR" sz="2900" kern="1200" dirty="0"/>
@@ -1243,7 +1263,7 @@
             <a:spcAft>
               <a:spcPct val="20000"/>
             </a:spcAft>
-            <a:buChar char="•"/>
+            <a:buChar char="••"/>
           </a:pPr>
           <a:r>
             <a:rPr lang="fr-FR" sz="2900" kern="1200" dirty="0"/>
@@ -1261,7 +1281,7 @@
             <a:spcAft>
               <a:spcPct val="20000"/>
             </a:spcAft>
-            <a:buChar char="•"/>
+            <a:buChar char="••"/>
           </a:pPr>
           <a:endParaRPr lang="fr-FR" sz="2900" kern="1200" dirty="0"/>
         </a:p>
@@ -2605,7 +2625,7 @@
           <a:p>
             <a:fld id="{090BB305-B547-43E9-A3C0-FBFA669CED81}" type="datetimeFigureOut">
               <a:rPr lang="fr-FR" smtClean="0"/>
-              <a:t>24/12/2021</a:t>
+              <a:t>26/01/2022</a:t>
             </a:fld>
             <a:endParaRPr lang="fr-FR"/>
           </a:p>
@@ -2773,7 +2793,7 @@
           <a:p>
             <a:fld id="{090BB305-B547-43E9-A3C0-FBFA669CED81}" type="datetimeFigureOut">
               <a:rPr lang="fr-FR" smtClean="0"/>
-              <a:t>24/12/2021</a:t>
+              <a:t>26/01/2022</a:t>
             </a:fld>
             <a:endParaRPr lang="fr-FR"/>
           </a:p>
@@ -2951,7 +2971,7 @@
           <a:p>
             <a:fld id="{090BB305-B547-43E9-A3C0-FBFA669CED81}" type="datetimeFigureOut">
               <a:rPr lang="fr-FR" smtClean="0"/>
-              <a:t>24/12/2021</a:t>
+              <a:t>26/01/2022</a:t>
             </a:fld>
             <a:endParaRPr lang="fr-FR"/>
           </a:p>
@@ -3119,7 +3139,7 @@
           <a:p>
             <a:fld id="{090BB305-B547-43E9-A3C0-FBFA669CED81}" type="datetimeFigureOut">
               <a:rPr lang="fr-FR" smtClean="0"/>
-              <a:t>24/12/2021</a:t>
+              <a:t>26/01/2022</a:t>
             </a:fld>
             <a:endParaRPr lang="fr-FR"/>
           </a:p>
@@ -3364,7 +3384,7 @@
           <a:p>
             <a:fld id="{090BB305-B547-43E9-A3C0-FBFA669CED81}" type="datetimeFigureOut">
               <a:rPr lang="fr-FR" smtClean="0"/>
-              <a:t>24/12/2021</a:t>
+              <a:t>26/01/2022</a:t>
             </a:fld>
             <a:endParaRPr lang="fr-FR"/>
           </a:p>
@@ -3593,7 +3613,7 @@
           <a:p>
             <a:fld id="{090BB305-B547-43E9-A3C0-FBFA669CED81}" type="datetimeFigureOut">
               <a:rPr lang="fr-FR" smtClean="0"/>
-              <a:t>24/12/2021</a:t>
+              <a:t>26/01/2022</a:t>
             </a:fld>
             <a:endParaRPr lang="fr-FR"/>
           </a:p>
@@ -3957,7 +3977,7 @@
           <a:p>
             <a:fld id="{090BB305-B547-43E9-A3C0-FBFA669CED81}" type="datetimeFigureOut">
               <a:rPr lang="fr-FR" smtClean="0"/>
-              <a:t>24/12/2021</a:t>
+              <a:t>26/01/2022</a:t>
             </a:fld>
             <a:endParaRPr lang="fr-FR"/>
           </a:p>
@@ -4074,7 +4094,7 @@
           <a:p>
             <a:fld id="{090BB305-B547-43E9-A3C0-FBFA669CED81}" type="datetimeFigureOut">
               <a:rPr lang="fr-FR" smtClean="0"/>
-              <a:t>24/12/2021</a:t>
+              <a:t>26/01/2022</a:t>
             </a:fld>
             <a:endParaRPr lang="fr-FR"/>
           </a:p>
@@ -4169,7 +4189,7 @@
           <a:p>
             <a:fld id="{090BB305-B547-43E9-A3C0-FBFA669CED81}" type="datetimeFigureOut">
               <a:rPr lang="fr-FR" smtClean="0"/>
-              <a:t>24/12/2021</a:t>
+              <a:t>26/01/2022</a:t>
             </a:fld>
             <a:endParaRPr lang="fr-FR"/>
           </a:p>
@@ -4444,7 +4464,7 @@
           <a:p>
             <a:fld id="{090BB305-B547-43E9-A3C0-FBFA669CED81}" type="datetimeFigureOut">
               <a:rPr lang="fr-FR" smtClean="0"/>
-              <a:t>24/12/2021</a:t>
+              <a:t>26/01/2022</a:t>
             </a:fld>
             <a:endParaRPr lang="fr-FR"/>
           </a:p>
@@ -4696,7 +4716,7 @@
           <a:p>
             <a:fld id="{090BB305-B547-43E9-A3C0-FBFA669CED81}" type="datetimeFigureOut">
               <a:rPr lang="fr-FR" smtClean="0"/>
-              <a:t>24/12/2021</a:t>
+              <a:t>26/01/2022</a:t>
             </a:fld>
             <a:endParaRPr lang="fr-FR"/>
           </a:p>
@@ -4907,7 +4927,7 @@
           <a:p>
             <a:fld id="{090BB305-B547-43E9-A3C0-FBFA669CED81}" type="datetimeFigureOut">
               <a:rPr lang="fr-FR" smtClean="0"/>
-              <a:t>24/12/2021</a:t>
+              <a:t>26/01/2022</a:t>
             </a:fld>
             <a:endParaRPr lang="fr-FR"/>
           </a:p>
@@ -6392,7 +6412,7 @@
         </p:nvSpPr>
         <p:spPr>
           <a:xfrm>
-            <a:off x="6786355" y="1371601"/>
+            <a:off x="4095402" y="1371601"/>
             <a:ext cx="3546364" cy="5290456"/>
           </a:xfrm>
           <a:prstGeom prst="rect">
@@ -6912,6 +6932,151 @@
                 </a:solidFill>
               </a:rPr>
               <a:t>, etc.)</a:t>
+            </a:r>
+          </a:p>
+        </p:txBody>
+      </p:sp>
+      <p:sp>
+        <p:nvSpPr>
+          <p:cNvPr id="7" name="Rectangle 6"/>
+          <p:cNvSpPr/>
+          <p:nvPr/>
+        </p:nvSpPr>
+        <p:spPr>
+          <a:xfrm>
+            <a:off x="8241265" y="2033897"/>
+            <a:ext cx="3546364" cy="2677886"/>
+          </a:xfrm>
+          <a:prstGeom prst="rect">
+            <a:avLst/>
+          </a:prstGeom>
+        </p:spPr>
+        <p:style>
+          <a:lnRef idx="2">
+            <a:schemeClr val="accent1"/>
+          </a:lnRef>
+          <a:fillRef idx="1">
+            <a:schemeClr val="lt1"/>
+          </a:fillRef>
+          <a:effectRef idx="0">
+            <a:schemeClr val="accent1"/>
+          </a:effectRef>
+          <a:fontRef idx="minor">
+            <a:schemeClr val="dk1"/>
+          </a:fontRef>
+        </p:style>
+        <p:txBody>
+          <a:bodyPr rtlCol="0" anchor="ctr"/>
+          <a:lstStyle/>
+          <a:p>
+            <a:pPr algn="ctr"/>
+            <a:r>
+              <a:rPr lang="fr-FR" b="1" dirty="0" err="1" smtClean="0"/>
+              <a:t>Ranking</a:t>
+            </a:r>
+            <a:endParaRPr lang="fr-FR" b="1" dirty="0"/>
+          </a:p>
+          <a:p>
+            <a:pPr algn="ctr"/>
+            <a:r>
+              <a:rPr lang="fr-FR" i="1" u="sng" dirty="0" err="1"/>
+              <a:t>CompetitorName</a:t>
+            </a:r>
+            <a:endParaRPr lang="fr-FR" i="1" u="sng" dirty="0"/>
+          </a:p>
+          <a:p>
+            <a:pPr algn="ctr"/>
+            <a:r>
+              <a:rPr lang="fr-FR" i="1" u="sng" dirty="0" err="1"/>
+              <a:t>CompetitorCategory</a:t>
+            </a:r>
+            <a:endParaRPr lang="fr-FR" i="1" u="sng" dirty="0"/>
+          </a:p>
+          <a:p>
+            <a:pPr algn="ctr"/>
+            <a:r>
+              <a:rPr lang="fr-FR" i="1" u="sng" dirty="0" smtClean="0"/>
+              <a:t>Date</a:t>
+            </a:r>
+          </a:p>
+          <a:p>
+            <a:pPr algn="ctr"/>
+            <a:r>
+              <a:rPr lang="fr-FR" i="1" dirty="0" err="1" smtClean="0"/>
+              <a:t>Scrapping</a:t>
+            </a:r>
+            <a:r>
+              <a:rPr lang="fr-FR" i="1" dirty="0" smtClean="0"/>
+              <a:t> :{Rank: …,</a:t>
+            </a:r>
+          </a:p>
+          <a:p>
+            <a:pPr algn="ctr"/>
+            <a:r>
+              <a:rPr lang="fr-FR" i="1" dirty="0" err="1" smtClean="0"/>
+              <a:t>Moy</a:t>
+            </a:r>
+            <a:r>
+              <a:rPr lang="fr-FR" i="1" dirty="0" smtClean="0"/>
+              <a:t>: …}</a:t>
+            </a:r>
+          </a:p>
+          <a:p>
+            <a:pPr algn="ctr"/>
+            <a:r>
+              <a:rPr lang="fr-FR" i="1" dirty="0" err="1" smtClean="0"/>
+              <a:t>Skill_based</a:t>
+            </a:r>
+            <a:r>
+              <a:rPr lang="fr-FR" i="1" dirty="0" smtClean="0"/>
+              <a:t>: {</a:t>
+            </a:r>
+            <a:r>
+              <a:rPr lang="fr-FR" i="1" dirty="0" err="1" smtClean="0"/>
+              <a:t>rank</a:t>
+            </a:r>
+            <a:r>
+              <a:rPr lang="fr-FR" i="1" dirty="0" smtClean="0"/>
+              <a:t>: …,</a:t>
+            </a:r>
+          </a:p>
+          <a:p>
+            <a:pPr algn="ctr"/>
+            <a:r>
+              <a:rPr lang="fr-FR" i="1" dirty="0" err="1" smtClean="0"/>
+              <a:t>Moy</a:t>
+            </a:r>
+            <a:r>
+              <a:rPr lang="fr-FR" i="1" dirty="0" smtClean="0"/>
+              <a:t>: …}</a:t>
+            </a:r>
+            <a:r>
+              <a:rPr lang="fr-FR" i="1" dirty="0" smtClean="0"/>
+              <a:t> </a:t>
+            </a:r>
+            <a:r>
+              <a:rPr lang="fr-FR" i="1" dirty="0" smtClean="0">
+                <a:solidFill>
+                  <a:schemeClr val="accent6"/>
+                </a:solidFill>
+              </a:rPr>
+              <a:t>Type1 </a:t>
+            </a:r>
+            <a:r>
+              <a:rPr lang="fr-FR" i="1" dirty="0">
+                <a:solidFill>
+                  <a:schemeClr val="accent6"/>
+                </a:solidFill>
+              </a:rPr>
+              <a:t>: {…}</a:t>
+            </a:r>
+            <a:r>
+              <a:rPr lang="fr-FR" i="1" dirty="0">
+                <a:solidFill>
+                  <a:schemeClr val="tx1"/>
+                </a:solidFill>
+              </a:rPr>
+              <a:t>}</a:t>
             </a:r>
           </a:p>
         </p:txBody>

</xml_diff>